<commit_message>
made gantt chart spreadsheet
</commit_message>
<xml_diff>
--- a/upgrade figures.pptx
+++ b/upgrade figures.pptx
@@ -5,7 +5,9 @@
     <p:sldMasterId id="2147483648" r:id="rId1"/>
   </p:sldMasterIdLst>
   <p:sldIdLst>
-    <p:sldId id="256" r:id="rId2"/>
+    <p:sldId id="257" r:id="rId2"/>
+    <p:sldId id="256" r:id="rId3"/>
+    <p:sldId id="258" r:id="rId4"/>
   </p:sldIdLst>
   <p:sldSz cx="12192000" cy="6858000"/>
   <p:notesSz cx="6858000" cy="9144000"/>
@@ -3326,15 +3328,15 @@
           <p:cNvPr id="2" name="Title 1">
             <a:extLst>
               <a:ext uri="{FF2B5EF4-FFF2-40B4-BE49-F238E27FC236}">
-                <a16:creationId xmlns:a16="http://schemas.microsoft.com/office/drawing/2014/main" id="{EFE4A7C6-3327-A6F7-4457-C72BA33BAE6B}"/>
-              </a:ext>
-            </a:extLst>
-          </p:cNvPr>
-          <p:cNvSpPr>
-            <a:spLocks noGrp="1"/>
-          </p:cNvSpPr>
-          <p:nvPr>
-            <p:ph type="ctrTitle"/>
+                <a16:creationId xmlns:a16="http://schemas.microsoft.com/office/drawing/2014/main" id="{31F7F529-46BF-5B51-2FE5-64D45608C324}"/>
+              </a:ext>
+            </a:extLst>
+          </p:cNvPr>
+          <p:cNvSpPr>
+            <a:spLocks noGrp="1"/>
+          </p:cNvSpPr>
+          <p:nvPr>
+            <p:ph type="title"/>
           </p:nvPr>
         </p:nvSpPr>
         <p:spPr/>
@@ -3342,39 +3344,1168 @@
           <a:bodyPr/>
           <a:lstStyle/>
           <a:p>
+            <a:r>
+              <a:rPr lang="en-GB" dirty="0"/>
+              <a:t>Fusilli development</a:t>
+            </a:r>
+          </a:p>
+        </p:txBody>
+      </p:sp>
+      <p:sp>
+        <p:nvSpPr>
+          <p:cNvPr id="3" name="Content Placeholder 2">
+            <a:extLst>
+              <a:ext uri="{FF2B5EF4-FFF2-40B4-BE49-F238E27FC236}">
+                <a16:creationId xmlns:a16="http://schemas.microsoft.com/office/drawing/2014/main" id="{E66C16A6-256A-2136-F2C3-B75775AB99E2}"/>
+              </a:ext>
+            </a:extLst>
+          </p:cNvPr>
+          <p:cNvSpPr>
+            <a:spLocks noGrp="1"/>
+          </p:cNvSpPr>
+          <p:nvPr>
+            <p:ph idx="1"/>
+          </p:nvPr>
+        </p:nvSpPr>
+        <p:spPr/>
+        <p:txBody>
+          <a:bodyPr/>
+          <a:lstStyle/>
+          <a:p>
+            <a:r>
+              <a:rPr lang="en-GB" dirty="0"/>
+              <a:t>Multi-figure with </a:t>
+            </a:r>
+          </a:p>
+          <a:p>
+            <a:pPr lvl="1"/>
+            <a:r>
+              <a:rPr lang="en-GB" dirty="0"/>
+              <a:t>Side bar</a:t>
+            </a:r>
+          </a:p>
+          <a:p>
+            <a:pPr lvl="1"/>
+            <a:r>
+              <a:rPr lang="en-GB" dirty="0"/>
+              <a:t>Front page</a:t>
+            </a:r>
+          </a:p>
+          <a:p>
+            <a:pPr lvl="1"/>
+            <a:r>
+              <a:rPr lang="en-GB" dirty="0"/>
+              <a:t>Example of model descriptions</a:t>
+            </a:r>
+          </a:p>
+          <a:p>
+            <a:pPr lvl="1"/>
+            <a:endParaRPr lang="en-GB" dirty="0"/>
+          </a:p>
+          <a:p>
+            <a:r>
+              <a:rPr lang="en-GB" dirty="0"/>
+              <a:t>Outputs of the models themselves</a:t>
+            </a:r>
+          </a:p>
+          <a:p>
+            <a:pPr lvl="1"/>
+            <a:r>
+              <a:rPr lang="en-GB" dirty="0"/>
+              <a:t>Reals vs preds </a:t>
+            </a:r>
+          </a:p>
+          <a:p>
+            <a:pPr lvl="1"/>
+            <a:r>
+              <a:rPr lang="en-GB" dirty="0" err="1"/>
+              <a:t>Kfold</a:t>
+            </a:r>
+            <a:endParaRPr lang="en-GB" dirty="0"/>
+          </a:p>
+          <a:p>
+            <a:pPr lvl="1"/>
+            <a:r>
+              <a:rPr lang="en-GB" dirty="0"/>
+              <a:t>Comparison</a:t>
+            </a:r>
+          </a:p>
+        </p:txBody>
+      </p:sp>
+    </p:spTree>
+    <p:extLst>
+      <p:ext uri="{BB962C8B-B14F-4D97-AF65-F5344CB8AC3E}">
+        <p14:creationId xmlns:p14="http://schemas.microsoft.com/office/powerpoint/2010/main" val="3006905990"/>
+      </p:ext>
+    </p:extLst>
+  </p:cSld>
+  <p:clrMapOvr>
+    <a:masterClrMapping/>
+  </p:clrMapOvr>
+</p:sld>
+</file>
+
+<file path=ppt/slides/slide2.xml><?xml version="1.0" encoding="utf-8"?>
+<p:sld xmlns:a="http://schemas.openxmlformats.org/drawingml/2006/main" xmlns:r="http://schemas.openxmlformats.org/officeDocument/2006/relationships" xmlns:p="http://schemas.openxmlformats.org/presentationml/2006/main">
+  <p:cSld>
+    <p:spTree>
+      <p:nvGrpSpPr>
+        <p:cNvPr id="1" name=""/>
+        <p:cNvGrpSpPr/>
+        <p:nvPr/>
+      </p:nvGrpSpPr>
+      <p:grpSpPr>
+        <a:xfrm>
+          <a:off x="0" y="0"/>
+          <a:ext cx="0" cy="0"/>
+          <a:chOff x="0" y="0"/>
+          <a:chExt cx="0" cy="0"/>
+        </a:xfrm>
+      </p:grpSpPr>
+      <p:sp>
+        <p:nvSpPr>
+          <p:cNvPr id="19" name="Rectangle 18">
+            <a:extLst>
+              <a:ext uri="{FF2B5EF4-FFF2-40B4-BE49-F238E27FC236}">
+                <a16:creationId xmlns:a16="http://schemas.microsoft.com/office/drawing/2014/main" id="{D00C185F-6236-EF2E-CC2A-957C8A6A7E98}"/>
+              </a:ext>
+            </a:extLst>
+          </p:cNvPr>
+          <p:cNvSpPr/>
+          <p:nvPr/>
+        </p:nvSpPr>
+        <p:spPr>
+          <a:xfrm>
+            <a:off x="2311732" y="400146"/>
+            <a:ext cx="6247052" cy="6210966"/>
+          </a:xfrm>
+          <a:prstGeom prst="rect">
+            <a:avLst/>
+          </a:prstGeom>
+          <a:solidFill>
+            <a:schemeClr val="bg1"/>
+          </a:solidFill>
+          <a:ln>
+            <a:noFill/>
+          </a:ln>
+        </p:spPr>
+        <p:style>
+          <a:lnRef idx="2">
+            <a:schemeClr val="accent1">
+              <a:shade val="15000"/>
+            </a:schemeClr>
+          </a:lnRef>
+          <a:fillRef idx="1">
+            <a:schemeClr val="accent1"/>
+          </a:fillRef>
+          <a:effectRef idx="0">
+            <a:schemeClr val="accent1"/>
+          </a:effectRef>
+          <a:fontRef idx="minor">
+            <a:schemeClr val="lt1"/>
+          </a:fontRef>
+        </p:style>
+        <p:txBody>
+          <a:bodyPr rtlCol="0" anchor="ctr"/>
+          <a:lstStyle/>
+          <a:p>
+            <a:pPr algn="ctr"/>
             <a:endParaRPr lang="en-GB"/>
           </a:p>
         </p:txBody>
       </p:sp>
-      <p:sp>
-        <p:nvSpPr>
-          <p:cNvPr id="3" name="Subtitle 2">
-            <a:extLst>
-              <a:ext uri="{FF2B5EF4-FFF2-40B4-BE49-F238E27FC236}">
-                <a16:creationId xmlns:a16="http://schemas.microsoft.com/office/drawing/2014/main" id="{C2C6F028-7D3E-5D8F-0104-6406B2413478}"/>
-              </a:ext>
-            </a:extLst>
-          </p:cNvPr>
-          <p:cNvSpPr>
-            <a:spLocks noGrp="1"/>
-          </p:cNvSpPr>
-          <p:nvPr>
-            <p:ph type="subTitle" idx="1"/>
-          </p:nvPr>
-        </p:nvSpPr>
-        <p:spPr/>
-        <p:txBody>
-          <a:bodyPr/>
-          <a:lstStyle/>
-          <a:p>
-            <a:endParaRPr lang="en-GB"/>
-          </a:p>
-        </p:txBody>
-      </p:sp>
+      <p:pic>
+        <p:nvPicPr>
+          <p:cNvPr id="5" name="Picture 4" descr="A screenshot of a cell phone&#10;&#10;Description automatically generated">
+            <a:extLst>
+              <a:ext uri="{FF2B5EF4-FFF2-40B4-BE49-F238E27FC236}">
+                <a16:creationId xmlns:a16="http://schemas.microsoft.com/office/drawing/2014/main" id="{8025936D-468A-9FE2-C596-A2F1B02D8E06}"/>
+              </a:ext>
+            </a:extLst>
+          </p:cNvPr>
+          <p:cNvPicPr>
+            <a:picLocks noChangeAspect="1"/>
+          </p:cNvPicPr>
+          <p:nvPr/>
+        </p:nvPicPr>
+        <p:blipFill>
+          <a:blip r:embed="rId2"/>
+          <a:stretch>
+            <a:fillRect/>
+          </a:stretch>
+        </p:blipFill>
+        <p:spPr>
+          <a:xfrm>
+            <a:off x="6096000" y="597788"/>
+            <a:ext cx="1876142" cy="5837815"/>
+          </a:xfrm>
+          <a:prstGeom prst="rect">
+            <a:avLst/>
+          </a:prstGeom>
+          <a:ln>
+            <a:solidFill>
+              <a:schemeClr val="tx1"/>
+            </a:solidFill>
+          </a:ln>
+        </p:spPr>
+      </p:pic>
+      <p:pic>
+        <p:nvPicPr>
+          <p:cNvPr id="7" name="Picture 6" descr="A screenshot of a computer&#10;&#10;Description automatically generated">
+            <a:extLst>
+              <a:ext uri="{FF2B5EF4-FFF2-40B4-BE49-F238E27FC236}">
+                <a16:creationId xmlns:a16="http://schemas.microsoft.com/office/drawing/2014/main" id="{49B19930-BC25-C3E1-47A5-4D41FF852E95}"/>
+              </a:ext>
+            </a:extLst>
+          </p:cNvPr>
+          <p:cNvPicPr>
+            <a:picLocks noChangeAspect="1"/>
+          </p:cNvPicPr>
+          <p:nvPr/>
+        </p:nvPicPr>
+        <p:blipFill>
+          <a:blip r:embed="rId3"/>
+          <a:stretch>
+            <a:fillRect/>
+          </a:stretch>
+        </p:blipFill>
+        <p:spPr>
+          <a:xfrm>
+            <a:off x="2935037" y="597788"/>
+            <a:ext cx="2928029" cy="1857816"/>
+          </a:xfrm>
+          <a:prstGeom prst="rect">
+            <a:avLst/>
+          </a:prstGeom>
+          <a:ln>
+            <a:solidFill>
+              <a:schemeClr val="tx1"/>
+            </a:solidFill>
+          </a:ln>
+        </p:spPr>
+      </p:pic>
+      <p:pic>
+        <p:nvPicPr>
+          <p:cNvPr id="9" name="Picture 8" descr="A screenshot of a diagram&#10;&#10;Description automatically generated">
+            <a:extLst>
+              <a:ext uri="{FF2B5EF4-FFF2-40B4-BE49-F238E27FC236}">
+                <a16:creationId xmlns:a16="http://schemas.microsoft.com/office/drawing/2014/main" id="{20A1D1C1-44A7-99E2-7C1C-07A6E4B64CFA}"/>
+              </a:ext>
+            </a:extLst>
+          </p:cNvPr>
+          <p:cNvPicPr>
+            <a:picLocks noChangeAspect="1"/>
+          </p:cNvPicPr>
+          <p:nvPr/>
+        </p:nvPicPr>
+        <p:blipFill>
+          <a:blip r:embed="rId4"/>
+          <a:stretch>
+            <a:fillRect/>
+          </a:stretch>
+        </p:blipFill>
+        <p:spPr>
+          <a:xfrm>
+            <a:off x="2935036" y="2575928"/>
+            <a:ext cx="2928029" cy="3859675"/>
+          </a:xfrm>
+          <a:prstGeom prst="rect">
+            <a:avLst/>
+          </a:prstGeom>
+          <a:ln>
+            <a:solidFill>
+              <a:schemeClr val="tx1"/>
+            </a:solidFill>
+          </a:ln>
+        </p:spPr>
+      </p:pic>
+      <p:grpSp>
+        <p:nvGrpSpPr>
+          <p:cNvPr id="21" name="Group 20">
+            <a:extLst>
+              <a:ext uri="{FF2B5EF4-FFF2-40B4-BE49-F238E27FC236}">
+                <a16:creationId xmlns:a16="http://schemas.microsoft.com/office/drawing/2014/main" id="{6EEABAD1-DABF-251F-A923-BC999C974E3A}"/>
+              </a:ext>
+            </a:extLst>
+          </p:cNvPr>
+          <p:cNvGrpSpPr/>
+          <p:nvPr/>
+        </p:nvGrpSpPr>
+        <p:grpSpPr>
+          <a:xfrm>
+            <a:off x="2449425" y="477464"/>
+            <a:ext cx="536647" cy="646331"/>
+            <a:chOff x="2317918" y="634364"/>
+            <a:chExt cx="536647" cy="646331"/>
+          </a:xfrm>
+        </p:grpSpPr>
+        <p:sp>
+          <p:nvSpPr>
+            <p:cNvPr id="10" name="TextBox 9">
+              <a:extLst>
+                <a:ext uri="{FF2B5EF4-FFF2-40B4-BE49-F238E27FC236}">
+                  <a16:creationId xmlns:a16="http://schemas.microsoft.com/office/drawing/2014/main" id="{311B4513-F4DC-98A5-B158-C9CCB20632B1}"/>
+                </a:ext>
+              </a:extLst>
+            </p:cNvPr>
+            <p:cNvSpPr txBox="1"/>
+            <p:nvPr/>
+          </p:nvSpPr>
+          <p:spPr>
+            <a:xfrm>
+              <a:off x="2317918" y="634364"/>
+              <a:ext cx="536647" cy="646331"/>
+            </a:xfrm>
+            <a:prstGeom prst="rect">
+              <a:avLst/>
+            </a:prstGeom>
+            <a:noFill/>
+          </p:spPr>
+          <p:txBody>
+            <a:bodyPr wrap="square" rtlCol="0">
+              <a:spAutoFit/>
+            </a:bodyPr>
+            <a:lstStyle/>
+            <a:p>
+              <a:pPr algn="ctr"/>
+              <a:r>
+                <a:rPr lang="en-GB" sz="3600" b="1" dirty="0"/>
+                <a:t>A</a:t>
+              </a:r>
+            </a:p>
+          </p:txBody>
+        </p:sp>
+        <p:sp>
+          <p:nvSpPr>
+            <p:cNvPr id="11" name="Rectangle 10">
+              <a:extLst>
+                <a:ext uri="{FF2B5EF4-FFF2-40B4-BE49-F238E27FC236}">
+                  <a16:creationId xmlns:a16="http://schemas.microsoft.com/office/drawing/2014/main" id="{28934FC6-F568-D4C3-3E60-C57B8B8DD5CB}"/>
+                </a:ext>
+              </a:extLst>
+            </p:cNvPr>
+            <p:cNvSpPr/>
+            <p:nvPr/>
+          </p:nvSpPr>
+          <p:spPr>
+            <a:xfrm>
+              <a:off x="2373743" y="748133"/>
+              <a:ext cx="424999" cy="424998"/>
+            </a:xfrm>
+            <a:prstGeom prst="rect">
+              <a:avLst/>
+            </a:prstGeom>
+            <a:noFill/>
+          </p:spPr>
+          <p:style>
+            <a:lnRef idx="2">
+              <a:schemeClr val="accent1">
+                <a:shade val="15000"/>
+              </a:schemeClr>
+            </a:lnRef>
+            <a:fillRef idx="1">
+              <a:schemeClr val="accent1"/>
+            </a:fillRef>
+            <a:effectRef idx="0">
+              <a:schemeClr val="accent1"/>
+            </a:effectRef>
+            <a:fontRef idx="minor">
+              <a:schemeClr val="lt1"/>
+            </a:fontRef>
+          </p:style>
+          <p:txBody>
+            <a:bodyPr rtlCol="0" anchor="ctr"/>
+            <a:lstStyle/>
+            <a:p>
+              <a:pPr algn="ctr"/>
+              <a:endParaRPr lang="en-GB"/>
+            </a:p>
+          </p:txBody>
+        </p:sp>
+      </p:grpSp>
+      <p:grpSp>
+        <p:nvGrpSpPr>
+          <p:cNvPr id="22" name="Group 21">
+            <a:extLst>
+              <a:ext uri="{FF2B5EF4-FFF2-40B4-BE49-F238E27FC236}">
+                <a16:creationId xmlns:a16="http://schemas.microsoft.com/office/drawing/2014/main" id="{243006AD-8069-7C4B-DA1F-7F37578C135E}"/>
+              </a:ext>
+            </a:extLst>
+          </p:cNvPr>
+          <p:cNvGrpSpPr/>
+          <p:nvPr/>
+        </p:nvGrpSpPr>
+        <p:grpSpPr>
+          <a:xfrm>
+            <a:off x="2445525" y="2456797"/>
+            <a:ext cx="536647" cy="646331"/>
+            <a:chOff x="2311732" y="2612505"/>
+            <a:chExt cx="536647" cy="646331"/>
+          </a:xfrm>
+        </p:grpSpPr>
+        <p:sp>
+          <p:nvSpPr>
+            <p:cNvPr id="14" name="TextBox 13">
+              <a:extLst>
+                <a:ext uri="{FF2B5EF4-FFF2-40B4-BE49-F238E27FC236}">
+                  <a16:creationId xmlns:a16="http://schemas.microsoft.com/office/drawing/2014/main" id="{FA605C3E-8F9C-80F0-D372-B49EC86BC341}"/>
+                </a:ext>
+              </a:extLst>
+            </p:cNvPr>
+            <p:cNvSpPr txBox="1"/>
+            <p:nvPr/>
+          </p:nvSpPr>
+          <p:spPr>
+            <a:xfrm>
+              <a:off x="2311732" y="2612505"/>
+              <a:ext cx="536647" cy="646331"/>
+            </a:xfrm>
+            <a:prstGeom prst="rect">
+              <a:avLst/>
+            </a:prstGeom>
+            <a:noFill/>
+          </p:spPr>
+          <p:txBody>
+            <a:bodyPr wrap="square" rtlCol="0">
+              <a:spAutoFit/>
+            </a:bodyPr>
+            <a:lstStyle/>
+            <a:p>
+              <a:pPr algn="ctr"/>
+              <a:r>
+                <a:rPr lang="en-GB" sz="3600" b="1" dirty="0"/>
+                <a:t>B</a:t>
+              </a:r>
+            </a:p>
+          </p:txBody>
+        </p:sp>
+        <p:sp>
+          <p:nvSpPr>
+            <p:cNvPr id="15" name="Rectangle 14">
+              <a:extLst>
+                <a:ext uri="{FF2B5EF4-FFF2-40B4-BE49-F238E27FC236}">
+                  <a16:creationId xmlns:a16="http://schemas.microsoft.com/office/drawing/2014/main" id="{35ADA7A7-64F3-17F5-2DD0-AF4F26754204}"/>
+                </a:ext>
+              </a:extLst>
+            </p:cNvPr>
+            <p:cNvSpPr/>
+            <p:nvPr/>
+          </p:nvSpPr>
+          <p:spPr>
+            <a:xfrm>
+              <a:off x="2367557" y="2726274"/>
+              <a:ext cx="424999" cy="424998"/>
+            </a:xfrm>
+            <a:prstGeom prst="rect">
+              <a:avLst/>
+            </a:prstGeom>
+            <a:noFill/>
+          </p:spPr>
+          <p:style>
+            <a:lnRef idx="2">
+              <a:schemeClr val="accent1">
+                <a:shade val="15000"/>
+              </a:schemeClr>
+            </a:lnRef>
+            <a:fillRef idx="1">
+              <a:schemeClr val="accent1"/>
+            </a:fillRef>
+            <a:effectRef idx="0">
+              <a:schemeClr val="accent1"/>
+            </a:effectRef>
+            <a:fontRef idx="minor">
+              <a:schemeClr val="lt1"/>
+            </a:fontRef>
+          </p:style>
+          <p:txBody>
+            <a:bodyPr rtlCol="0" anchor="ctr"/>
+            <a:lstStyle/>
+            <a:p>
+              <a:pPr algn="ctr"/>
+              <a:endParaRPr lang="en-GB"/>
+            </a:p>
+          </p:txBody>
+        </p:sp>
+      </p:grpSp>
+      <p:grpSp>
+        <p:nvGrpSpPr>
+          <p:cNvPr id="23" name="Group 22">
+            <a:extLst>
+              <a:ext uri="{FF2B5EF4-FFF2-40B4-BE49-F238E27FC236}">
+                <a16:creationId xmlns:a16="http://schemas.microsoft.com/office/drawing/2014/main" id="{F0E1F817-6A74-28D4-BB9B-DFF7744F9AC2}"/>
+              </a:ext>
+            </a:extLst>
+          </p:cNvPr>
+          <p:cNvGrpSpPr/>
+          <p:nvPr/>
+        </p:nvGrpSpPr>
+        <p:grpSpPr>
+          <a:xfrm>
+            <a:off x="7918464" y="486607"/>
+            <a:ext cx="536647" cy="646331"/>
+            <a:chOff x="5987534" y="634364"/>
+            <a:chExt cx="536647" cy="646331"/>
+          </a:xfrm>
+        </p:grpSpPr>
+        <p:sp>
+          <p:nvSpPr>
+            <p:cNvPr id="17" name="TextBox 16">
+              <a:extLst>
+                <a:ext uri="{FF2B5EF4-FFF2-40B4-BE49-F238E27FC236}">
+                  <a16:creationId xmlns:a16="http://schemas.microsoft.com/office/drawing/2014/main" id="{AEBAFFFA-8011-BC52-961B-EFF1C98A25D8}"/>
+                </a:ext>
+              </a:extLst>
+            </p:cNvPr>
+            <p:cNvSpPr txBox="1"/>
+            <p:nvPr/>
+          </p:nvSpPr>
+          <p:spPr>
+            <a:xfrm>
+              <a:off x="5987534" y="634364"/>
+              <a:ext cx="536647" cy="646331"/>
+            </a:xfrm>
+            <a:prstGeom prst="rect">
+              <a:avLst/>
+            </a:prstGeom>
+            <a:noFill/>
+          </p:spPr>
+          <p:txBody>
+            <a:bodyPr wrap="square" rtlCol="0">
+              <a:spAutoFit/>
+            </a:bodyPr>
+            <a:lstStyle/>
+            <a:p>
+              <a:pPr algn="ctr"/>
+              <a:r>
+                <a:rPr lang="en-GB" sz="3600" b="1" dirty="0"/>
+                <a:t>C</a:t>
+              </a:r>
+            </a:p>
+          </p:txBody>
+        </p:sp>
+        <p:sp>
+          <p:nvSpPr>
+            <p:cNvPr id="18" name="Rectangle 17">
+              <a:extLst>
+                <a:ext uri="{FF2B5EF4-FFF2-40B4-BE49-F238E27FC236}">
+                  <a16:creationId xmlns:a16="http://schemas.microsoft.com/office/drawing/2014/main" id="{2FA2511C-56C8-7314-DA72-69FA96A7A06D}"/>
+                </a:ext>
+              </a:extLst>
+            </p:cNvPr>
+            <p:cNvSpPr/>
+            <p:nvPr/>
+          </p:nvSpPr>
+          <p:spPr>
+            <a:xfrm>
+              <a:off x="6043359" y="748133"/>
+              <a:ext cx="424999" cy="424998"/>
+            </a:xfrm>
+            <a:prstGeom prst="rect">
+              <a:avLst/>
+            </a:prstGeom>
+            <a:noFill/>
+          </p:spPr>
+          <p:style>
+            <a:lnRef idx="2">
+              <a:schemeClr val="accent1">
+                <a:shade val="15000"/>
+              </a:schemeClr>
+            </a:lnRef>
+            <a:fillRef idx="1">
+              <a:schemeClr val="accent1"/>
+            </a:fillRef>
+            <a:effectRef idx="0">
+              <a:schemeClr val="accent1"/>
+            </a:effectRef>
+            <a:fontRef idx="minor">
+              <a:schemeClr val="lt1"/>
+            </a:fontRef>
+          </p:style>
+          <p:txBody>
+            <a:bodyPr rtlCol="0" anchor="ctr"/>
+            <a:lstStyle/>
+            <a:p>
+              <a:pPr algn="ctr"/>
+              <a:endParaRPr lang="en-GB"/>
+            </a:p>
+          </p:txBody>
+        </p:sp>
+      </p:grpSp>
     </p:spTree>
     <p:extLst>
       <p:ext uri="{BB962C8B-B14F-4D97-AF65-F5344CB8AC3E}">
         <p14:creationId xmlns:p14="http://schemas.microsoft.com/office/powerpoint/2010/main" val="406580634"/>
+      </p:ext>
+    </p:extLst>
+  </p:cSld>
+  <p:clrMapOvr>
+    <a:masterClrMapping/>
+  </p:clrMapOvr>
+</p:sld>
+</file>
+
+<file path=ppt/slides/slide3.xml><?xml version="1.0" encoding="utf-8"?>
+<p:sld xmlns:a="http://schemas.openxmlformats.org/drawingml/2006/main" xmlns:r="http://schemas.openxmlformats.org/officeDocument/2006/relationships" xmlns:p="http://schemas.openxmlformats.org/presentationml/2006/main">
+  <p:cSld>
+    <p:spTree>
+      <p:nvGrpSpPr>
+        <p:cNvPr id="1" name=""/>
+        <p:cNvGrpSpPr/>
+        <p:nvPr/>
+      </p:nvGrpSpPr>
+      <p:grpSpPr>
+        <a:xfrm>
+          <a:off x="0" y="0"/>
+          <a:ext cx="0" cy="0"/>
+          <a:chOff x="0" y="0"/>
+          <a:chExt cx="0" cy="0"/>
+        </a:xfrm>
+      </p:grpSpPr>
+      <p:grpSp>
+        <p:nvGrpSpPr>
+          <p:cNvPr id="14" name="Group 13">
+            <a:extLst>
+              <a:ext uri="{FF2B5EF4-FFF2-40B4-BE49-F238E27FC236}">
+                <a16:creationId xmlns:a16="http://schemas.microsoft.com/office/drawing/2014/main" id="{3C956638-7738-3AD8-236F-2F1375A65A32}"/>
+              </a:ext>
+            </a:extLst>
+          </p:cNvPr>
+          <p:cNvGrpSpPr/>
+          <p:nvPr/>
+        </p:nvGrpSpPr>
+        <p:grpSpPr>
+          <a:xfrm>
+            <a:off x="2313830" y="400146"/>
+            <a:ext cx="6901732" cy="4871569"/>
+            <a:chOff x="2313830" y="400146"/>
+            <a:chExt cx="6901732" cy="4871569"/>
+          </a:xfrm>
+        </p:grpSpPr>
+        <p:sp>
+          <p:nvSpPr>
+            <p:cNvPr id="13" name="Rectangle 12">
+              <a:extLst>
+                <a:ext uri="{FF2B5EF4-FFF2-40B4-BE49-F238E27FC236}">
+                  <a16:creationId xmlns:a16="http://schemas.microsoft.com/office/drawing/2014/main" id="{371A743A-88E1-1B44-05E6-833FB5DC5205}"/>
+                </a:ext>
+              </a:extLst>
+            </p:cNvPr>
+            <p:cNvSpPr/>
+            <p:nvPr/>
+          </p:nvSpPr>
+          <p:spPr>
+            <a:xfrm>
+              <a:off x="2313830" y="400146"/>
+              <a:ext cx="6901732" cy="4871569"/>
+            </a:xfrm>
+            <a:prstGeom prst="rect">
+              <a:avLst/>
+            </a:prstGeom>
+            <a:solidFill>
+              <a:schemeClr val="bg1"/>
+            </a:solidFill>
+            <a:ln>
+              <a:noFill/>
+            </a:ln>
+          </p:spPr>
+          <p:style>
+            <a:lnRef idx="2">
+              <a:schemeClr val="accent1">
+                <a:shade val="15000"/>
+              </a:schemeClr>
+            </a:lnRef>
+            <a:fillRef idx="1">
+              <a:schemeClr val="accent1"/>
+            </a:fillRef>
+            <a:effectRef idx="0">
+              <a:schemeClr val="accent1"/>
+            </a:effectRef>
+            <a:fontRef idx="minor">
+              <a:schemeClr val="lt1"/>
+            </a:fontRef>
+          </p:style>
+          <p:txBody>
+            <a:bodyPr rtlCol="0" anchor="ctr"/>
+            <a:lstStyle/>
+            <a:p>
+              <a:pPr algn="ctr"/>
+              <a:endParaRPr lang="en-GB"/>
+            </a:p>
+          </p:txBody>
+        </p:sp>
+        <p:pic>
+          <p:nvPicPr>
+            <p:cNvPr id="2050" name="Picture 2" descr="Loss Curves for ConcatTabularFeatureMaps">
+              <a:extLst>
+                <a:ext uri="{FF2B5EF4-FFF2-40B4-BE49-F238E27FC236}">
+                  <a16:creationId xmlns:a16="http://schemas.microsoft.com/office/drawing/2014/main" id="{C6BD3C95-865C-EDA7-A8DA-5139DAF15A8F}"/>
+                </a:ext>
+              </a:extLst>
+            </p:cNvPr>
+            <p:cNvPicPr>
+              <a:picLocks noChangeAspect="1" noChangeArrowheads="1"/>
+            </p:cNvPicPr>
+            <p:nvPr/>
+          </p:nvPicPr>
+          <p:blipFill>
+            <a:blip r:embed="rId2">
+              <a:extLst>
+                <a:ext uri="{28A0092B-C50C-407E-A947-70E740481C1C}">
+                  <a14:useLocalDpi xmlns:a14="http://schemas.microsoft.com/office/drawing/2010/main" val="0"/>
+                </a:ext>
+              </a:extLst>
+            </a:blip>
+            <a:srcRect/>
+            <a:stretch>
+              <a:fillRect/>
+            </a:stretch>
+          </p:blipFill>
+          <p:spPr bwMode="auto">
+            <a:xfrm>
+              <a:off x="2883410" y="528067"/>
+              <a:ext cx="2819398" cy="2114549"/>
+            </a:xfrm>
+            <a:prstGeom prst="rect">
+              <a:avLst/>
+            </a:prstGeom>
+            <a:noFill/>
+            <a:ln>
+              <a:solidFill>
+                <a:schemeClr val="tx1"/>
+              </a:solidFill>
+            </a:ln>
+            <a:extLst>
+              <a:ext uri="{909E8E84-426E-40DD-AFC4-6F175D3DCCD1}">
+                <a14:hiddenFill xmlns:a14="http://schemas.microsoft.com/office/drawing/2010/main">
+                  <a:solidFill>
+                    <a:srgbClr val="FFFFFF"/>
+                  </a:solidFill>
+                </a14:hiddenFill>
+              </a:ext>
+            </a:extLst>
+          </p:spPr>
+        </p:pic>
+        <p:pic>
+          <p:nvPicPr>
+            <p:cNvPr id="2052" name="Picture 4" descr="TabularCrossmodalMultiheadAttention: confusion matrix, Tabular Crossmodal multi-head attention: auroc=0.600, Fold 1: auroc=0.796, Fold 2: auroc=0.734, Fold 3: auroc=0.734, Fold 4: auroc=0.500, Fold 5: auroc=0.494">
+              <a:extLst>
+                <a:ext uri="{FF2B5EF4-FFF2-40B4-BE49-F238E27FC236}">
+                  <a16:creationId xmlns:a16="http://schemas.microsoft.com/office/drawing/2014/main" id="{541706DE-9998-FF8C-FC48-3E452459BDB6}"/>
+                </a:ext>
+              </a:extLst>
+            </p:cNvPr>
+            <p:cNvPicPr>
+              <a:picLocks noChangeAspect="1" noChangeArrowheads="1"/>
+            </p:cNvPicPr>
+            <p:nvPr/>
+          </p:nvPicPr>
+          <p:blipFill>
+            <a:blip r:embed="rId3">
+              <a:extLst>
+                <a:ext uri="{28A0092B-C50C-407E-A947-70E740481C1C}">
+                  <a14:useLocalDpi xmlns:a14="http://schemas.microsoft.com/office/drawing/2010/main" val="0"/>
+                </a:ext>
+              </a:extLst>
+            </a:blip>
+            <a:srcRect/>
+            <a:stretch>
+              <a:fillRect/>
+            </a:stretch>
+          </p:blipFill>
+          <p:spPr bwMode="auto">
+            <a:xfrm>
+              <a:off x="2883410" y="2779776"/>
+              <a:ext cx="5794246" cy="2317698"/>
+            </a:xfrm>
+            <a:prstGeom prst="rect">
+              <a:avLst/>
+            </a:prstGeom>
+            <a:noFill/>
+            <a:ln>
+              <a:solidFill>
+                <a:schemeClr val="tx1"/>
+              </a:solidFill>
+            </a:ln>
+            <a:extLst>
+              <a:ext uri="{909E8E84-426E-40DD-AFC4-6F175D3DCCD1}">
+                <a14:hiddenFill xmlns:a14="http://schemas.microsoft.com/office/drawing/2010/main">
+                  <a:solidFill>
+                    <a:srgbClr val="FFFFFF"/>
+                  </a:solidFill>
+                </a14:hiddenFill>
+              </a:ext>
+            </a:extLst>
+          </p:spPr>
+        </p:pic>
+        <p:pic>
+          <p:nvPicPr>
+            <p:cNvPr id="2054" name="Picture 6" descr="Distribution of metrics between cross-validation folds, auroc, accuracy">
+              <a:extLst>
+                <a:ext uri="{FF2B5EF4-FFF2-40B4-BE49-F238E27FC236}">
+                  <a16:creationId xmlns:a16="http://schemas.microsoft.com/office/drawing/2014/main" id="{D3031370-F84A-2898-A68B-C238AB9F1F68}"/>
+                </a:ext>
+              </a:extLst>
+            </p:cNvPr>
+            <p:cNvPicPr>
+              <a:picLocks noChangeAspect="1" noChangeArrowheads="1"/>
+            </p:cNvPicPr>
+            <p:nvPr/>
+          </p:nvPicPr>
+          <p:blipFill>
+            <a:blip r:embed="rId4">
+              <a:extLst>
+                <a:ext uri="{28A0092B-C50C-407E-A947-70E740481C1C}">
+                  <a14:useLocalDpi xmlns:a14="http://schemas.microsoft.com/office/drawing/2010/main" val="0"/>
+                </a:ext>
+              </a:extLst>
+            </a:blip>
+            <a:srcRect/>
+            <a:stretch>
+              <a:fillRect/>
+            </a:stretch>
+          </p:blipFill>
+          <p:spPr bwMode="auto">
+            <a:xfrm>
+              <a:off x="5858258" y="528067"/>
+              <a:ext cx="2819398" cy="2114549"/>
+            </a:xfrm>
+            <a:prstGeom prst="rect">
+              <a:avLst/>
+            </a:prstGeom>
+            <a:noFill/>
+            <a:ln>
+              <a:solidFill>
+                <a:schemeClr val="tx1"/>
+              </a:solidFill>
+            </a:ln>
+            <a:extLst>
+              <a:ext uri="{909E8E84-426E-40DD-AFC4-6F175D3DCCD1}">
+                <a14:hiddenFill xmlns:a14="http://schemas.microsoft.com/office/drawing/2010/main">
+                  <a:solidFill>
+                    <a:srgbClr val="FFFFFF"/>
+                  </a:solidFill>
+                </a14:hiddenFill>
+              </a:ext>
+            </a:extLst>
+          </p:spPr>
+        </p:pic>
+        <p:grpSp>
+          <p:nvGrpSpPr>
+            <p:cNvPr id="4" name="Group 3">
+              <a:extLst>
+                <a:ext uri="{FF2B5EF4-FFF2-40B4-BE49-F238E27FC236}">
+                  <a16:creationId xmlns:a16="http://schemas.microsoft.com/office/drawing/2014/main" id="{5575B3D9-3B74-6554-D253-D348FB712C8E}"/>
+                </a:ext>
+              </a:extLst>
+            </p:cNvPr>
+            <p:cNvGrpSpPr/>
+            <p:nvPr/>
+          </p:nvGrpSpPr>
+          <p:grpSpPr>
+            <a:xfrm>
+              <a:off x="2394740" y="409195"/>
+              <a:ext cx="536647" cy="646331"/>
+              <a:chOff x="2317918" y="634364"/>
+              <a:chExt cx="536647" cy="646331"/>
+            </a:xfrm>
+          </p:grpSpPr>
+          <p:sp>
+            <p:nvSpPr>
+              <p:cNvPr id="5" name="TextBox 4">
+                <a:extLst>
+                  <a:ext uri="{FF2B5EF4-FFF2-40B4-BE49-F238E27FC236}">
+                    <a16:creationId xmlns:a16="http://schemas.microsoft.com/office/drawing/2014/main" id="{AA7CF76E-EAFE-DE8B-29B6-9CC9795668C3}"/>
+                  </a:ext>
+                </a:extLst>
+              </p:cNvPr>
+              <p:cNvSpPr txBox="1"/>
+              <p:nvPr/>
+            </p:nvSpPr>
+            <p:spPr>
+              <a:xfrm>
+                <a:off x="2317918" y="634364"/>
+                <a:ext cx="536647" cy="646331"/>
+              </a:xfrm>
+              <a:prstGeom prst="rect">
+                <a:avLst/>
+              </a:prstGeom>
+              <a:noFill/>
+            </p:spPr>
+            <p:txBody>
+              <a:bodyPr wrap="square" rtlCol="0">
+                <a:spAutoFit/>
+              </a:bodyPr>
+              <a:lstStyle/>
+              <a:p>
+                <a:pPr algn="ctr"/>
+                <a:r>
+                  <a:rPr lang="en-GB" sz="3600" b="1" dirty="0"/>
+                  <a:t>A</a:t>
+                </a:r>
+              </a:p>
+            </p:txBody>
+          </p:sp>
+          <p:sp>
+            <p:nvSpPr>
+              <p:cNvPr id="6" name="Rectangle 5">
+                <a:extLst>
+                  <a:ext uri="{FF2B5EF4-FFF2-40B4-BE49-F238E27FC236}">
+                    <a16:creationId xmlns:a16="http://schemas.microsoft.com/office/drawing/2014/main" id="{11169EAF-A350-FC43-F09A-432ED12E2ABA}"/>
+                  </a:ext>
+                </a:extLst>
+              </p:cNvPr>
+              <p:cNvSpPr/>
+              <p:nvPr/>
+            </p:nvSpPr>
+            <p:spPr>
+              <a:xfrm>
+                <a:off x="2373743" y="748133"/>
+                <a:ext cx="424999" cy="424998"/>
+              </a:xfrm>
+              <a:prstGeom prst="rect">
+                <a:avLst/>
+              </a:prstGeom>
+              <a:noFill/>
+            </p:spPr>
+            <p:style>
+              <a:lnRef idx="2">
+                <a:schemeClr val="accent1">
+                  <a:shade val="15000"/>
+                </a:schemeClr>
+              </a:lnRef>
+              <a:fillRef idx="1">
+                <a:schemeClr val="accent1"/>
+              </a:fillRef>
+              <a:effectRef idx="0">
+                <a:schemeClr val="accent1"/>
+              </a:effectRef>
+              <a:fontRef idx="minor">
+                <a:schemeClr val="lt1"/>
+              </a:fontRef>
+            </p:style>
+            <p:txBody>
+              <a:bodyPr rtlCol="0" anchor="ctr"/>
+              <a:lstStyle/>
+              <a:p>
+                <a:pPr algn="ctr"/>
+                <a:endParaRPr lang="en-GB"/>
+              </a:p>
+            </p:txBody>
+          </p:sp>
+        </p:grpSp>
+        <p:grpSp>
+          <p:nvGrpSpPr>
+            <p:cNvPr id="7" name="Group 6">
+              <a:extLst>
+                <a:ext uri="{FF2B5EF4-FFF2-40B4-BE49-F238E27FC236}">
+                  <a16:creationId xmlns:a16="http://schemas.microsoft.com/office/drawing/2014/main" id="{EE0C51A4-84CE-338F-DDBB-3FE96D914E01}"/>
+                </a:ext>
+              </a:extLst>
+            </p:cNvPr>
+            <p:cNvGrpSpPr/>
+            <p:nvPr/>
+          </p:nvGrpSpPr>
+          <p:grpSpPr>
+            <a:xfrm>
+              <a:off x="2399805" y="2661637"/>
+              <a:ext cx="536647" cy="646331"/>
+              <a:chOff x="2311732" y="2612505"/>
+              <a:chExt cx="536647" cy="646331"/>
+            </a:xfrm>
+          </p:grpSpPr>
+          <p:sp>
+            <p:nvSpPr>
+              <p:cNvPr id="8" name="TextBox 7">
+                <a:extLst>
+                  <a:ext uri="{FF2B5EF4-FFF2-40B4-BE49-F238E27FC236}">
+                    <a16:creationId xmlns:a16="http://schemas.microsoft.com/office/drawing/2014/main" id="{DFE49D00-102D-56E2-2507-E5459B687496}"/>
+                  </a:ext>
+                </a:extLst>
+              </p:cNvPr>
+              <p:cNvSpPr txBox="1"/>
+              <p:nvPr/>
+            </p:nvSpPr>
+            <p:spPr>
+              <a:xfrm>
+                <a:off x="2311732" y="2612505"/>
+                <a:ext cx="536647" cy="646331"/>
+              </a:xfrm>
+              <a:prstGeom prst="rect">
+                <a:avLst/>
+              </a:prstGeom>
+              <a:noFill/>
+            </p:spPr>
+            <p:txBody>
+              <a:bodyPr wrap="square" rtlCol="0">
+                <a:spAutoFit/>
+              </a:bodyPr>
+              <a:lstStyle/>
+              <a:p>
+                <a:pPr algn="ctr"/>
+                <a:r>
+                  <a:rPr lang="en-GB" sz="3600" b="1" dirty="0"/>
+                  <a:t>B</a:t>
+                </a:r>
+              </a:p>
+            </p:txBody>
+          </p:sp>
+          <p:sp>
+            <p:nvSpPr>
+              <p:cNvPr id="9" name="Rectangle 8">
+                <a:extLst>
+                  <a:ext uri="{FF2B5EF4-FFF2-40B4-BE49-F238E27FC236}">
+                    <a16:creationId xmlns:a16="http://schemas.microsoft.com/office/drawing/2014/main" id="{476159BF-B9B2-391A-FE65-399A308AEFBF}"/>
+                  </a:ext>
+                </a:extLst>
+              </p:cNvPr>
+              <p:cNvSpPr/>
+              <p:nvPr/>
+            </p:nvSpPr>
+            <p:spPr>
+              <a:xfrm>
+                <a:off x="2367557" y="2726274"/>
+                <a:ext cx="424999" cy="424998"/>
+              </a:xfrm>
+              <a:prstGeom prst="rect">
+                <a:avLst/>
+              </a:prstGeom>
+              <a:noFill/>
+            </p:spPr>
+            <p:style>
+              <a:lnRef idx="2">
+                <a:schemeClr val="accent1">
+                  <a:shade val="15000"/>
+                </a:schemeClr>
+              </a:lnRef>
+              <a:fillRef idx="1">
+                <a:schemeClr val="accent1"/>
+              </a:fillRef>
+              <a:effectRef idx="0">
+                <a:schemeClr val="accent1"/>
+              </a:effectRef>
+              <a:fontRef idx="minor">
+                <a:schemeClr val="lt1"/>
+              </a:fontRef>
+            </p:style>
+            <p:txBody>
+              <a:bodyPr rtlCol="0" anchor="ctr"/>
+              <a:lstStyle/>
+              <a:p>
+                <a:pPr algn="ctr"/>
+                <a:endParaRPr lang="en-GB"/>
+              </a:p>
+            </p:txBody>
+          </p:sp>
+        </p:grpSp>
+        <p:grpSp>
+          <p:nvGrpSpPr>
+            <p:cNvPr id="10" name="Group 9">
+              <a:extLst>
+                <a:ext uri="{FF2B5EF4-FFF2-40B4-BE49-F238E27FC236}">
+                  <a16:creationId xmlns:a16="http://schemas.microsoft.com/office/drawing/2014/main" id="{02D3096E-8A88-DCBE-5149-1FE2DA380ED6}"/>
+                </a:ext>
+              </a:extLst>
+            </p:cNvPr>
+            <p:cNvGrpSpPr/>
+            <p:nvPr/>
+          </p:nvGrpSpPr>
+          <p:grpSpPr>
+            <a:xfrm>
+              <a:off x="8627216" y="409267"/>
+              <a:ext cx="536647" cy="646331"/>
+              <a:chOff x="5987534" y="634364"/>
+              <a:chExt cx="536647" cy="646331"/>
+            </a:xfrm>
+          </p:grpSpPr>
+          <p:sp>
+            <p:nvSpPr>
+              <p:cNvPr id="11" name="TextBox 10">
+                <a:extLst>
+                  <a:ext uri="{FF2B5EF4-FFF2-40B4-BE49-F238E27FC236}">
+                    <a16:creationId xmlns:a16="http://schemas.microsoft.com/office/drawing/2014/main" id="{0DE3889C-0D20-48EF-9BEE-8A84413F5563}"/>
+                  </a:ext>
+                </a:extLst>
+              </p:cNvPr>
+              <p:cNvSpPr txBox="1"/>
+              <p:nvPr/>
+            </p:nvSpPr>
+            <p:spPr>
+              <a:xfrm>
+                <a:off x="5987534" y="634364"/>
+                <a:ext cx="536647" cy="646331"/>
+              </a:xfrm>
+              <a:prstGeom prst="rect">
+                <a:avLst/>
+              </a:prstGeom>
+              <a:noFill/>
+            </p:spPr>
+            <p:txBody>
+              <a:bodyPr wrap="square" rtlCol="0">
+                <a:spAutoFit/>
+              </a:bodyPr>
+              <a:lstStyle/>
+              <a:p>
+                <a:pPr algn="ctr"/>
+                <a:r>
+                  <a:rPr lang="en-GB" sz="3600" b="1" dirty="0"/>
+                  <a:t>C</a:t>
+                </a:r>
+              </a:p>
+            </p:txBody>
+          </p:sp>
+          <p:sp>
+            <p:nvSpPr>
+              <p:cNvPr id="12" name="Rectangle 11">
+                <a:extLst>
+                  <a:ext uri="{FF2B5EF4-FFF2-40B4-BE49-F238E27FC236}">
+                    <a16:creationId xmlns:a16="http://schemas.microsoft.com/office/drawing/2014/main" id="{BA548406-40E6-0466-7C45-6FF0701485A5}"/>
+                  </a:ext>
+                </a:extLst>
+              </p:cNvPr>
+              <p:cNvSpPr/>
+              <p:nvPr/>
+            </p:nvSpPr>
+            <p:spPr>
+              <a:xfrm>
+                <a:off x="6043359" y="748133"/>
+                <a:ext cx="424999" cy="424998"/>
+              </a:xfrm>
+              <a:prstGeom prst="rect">
+                <a:avLst/>
+              </a:prstGeom>
+              <a:noFill/>
+            </p:spPr>
+            <p:style>
+              <a:lnRef idx="2">
+                <a:schemeClr val="accent1">
+                  <a:shade val="15000"/>
+                </a:schemeClr>
+              </a:lnRef>
+              <a:fillRef idx="1">
+                <a:schemeClr val="accent1"/>
+              </a:fillRef>
+              <a:effectRef idx="0">
+                <a:schemeClr val="accent1"/>
+              </a:effectRef>
+              <a:fontRef idx="minor">
+                <a:schemeClr val="lt1"/>
+              </a:fontRef>
+            </p:style>
+            <p:txBody>
+              <a:bodyPr rtlCol="0" anchor="ctr"/>
+              <a:lstStyle/>
+              <a:p>
+                <a:pPr algn="ctr"/>
+                <a:endParaRPr lang="en-GB"/>
+              </a:p>
+            </p:txBody>
+          </p:sp>
+        </p:grpSp>
+      </p:grpSp>
+    </p:spTree>
+    <p:extLst>
+      <p:ext uri="{BB962C8B-B14F-4D97-AF65-F5344CB8AC3E}">
+        <p14:creationId xmlns:p14="http://schemas.microsoft.com/office/powerpoint/2010/main" val="3172157182"/>
       </p:ext>
     </p:extLst>
   </p:cSld>

</xml_diff>

<commit_message>
made notes for cox model results, time to make tables in overleaf
</commit_message>
<xml_diff>
--- a/upgrade figures.pptx
+++ b/upgrade figures.pptx
@@ -8,6 +8,7 @@
     <p:sldId id="257" r:id="rId2"/>
     <p:sldId id="256" r:id="rId3"/>
     <p:sldId id="258" r:id="rId4"/>
+    <p:sldId id="259" r:id="rId5"/>
   </p:sldIdLst>
   <p:sldSz cx="12192000" cy="6858000"/>
   <p:notesSz cx="6858000" cy="9144000"/>
@@ -106,6 +107,11 @@
       </a:defRPr>
     </a:lvl9pPr>
   </p:defaultTextStyle>
+  <p:extLst>
+    <p:ext uri="{EFAFB233-063F-42B5-8137-9DF3F51BA10A}">
+      <p15:sldGuideLst xmlns:p15="http://schemas.microsoft.com/office/powerpoint/2012/main"/>
+    </p:ext>
+  </p:extLst>
 </p:presentation>
 </file>
 
@@ -256,7 +262,7 @@
           <a:p>
             <a:fld id="{E4D19850-80EB-C04C-A1A6-3B2217F8D0AE}" type="datetimeFigureOut">
               <a:rPr lang="en-GB" smtClean="0"/>
-              <a:t>15/03/2024</a:t>
+              <a:t>18/03/2024</a:t>
             </a:fld>
             <a:endParaRPr lang="en-GB"/>
           </a:p>
@@ -454,7 +460,7 @@
           <a:p>
             <a:fld id="{E4D19850-80EB-C04C-A1A6-3B2217F8D0AE}" type="datetimeFigureOut">
               <a:rPr lang="en-GB" smtClean="0"/>
-              <a:t>15/03/2024</a:t>
+              <a:t>18/03/2024</a:t>
             </a:fld>
             <a:endParaRPr lang="en-GB"/>
           </a:p>
@@ -662,7 +668,7 @@
           <a:p>
             <a:fld id="{E4D19850-80EB-C04C-A1A6-3B2217F8D0AE}" type="datetimeFigureOut">
               <a:rPr lang="en-GB" smtClean="0"/>
-              <a:t>15/03/2024</a:t>
+              <a:t>18/03/2024</a:t>
             </a:fld>
             <a:endParaRPr lang="en-GB"/>
           </a:p>
@@ -860,7 +866,7 @@
           <a:p>
             <a:fld id="{E4D19850-80EB-C04C-A1A6-3B2217F8D0AE}" type="datetimeFigureOut">
               <a:rPr lang="en-GB" smtClean="0"/>
-              <a:t>15/03/2024</a:t>
+              <a:t>18/03/2024</a:t>
             </a:fld>
             <a:endParaRPr lang="en-GB"/>
           </a:p>
@@ -1135,7 +1141,7 @@
           <a:p>
             <a:fld id="{E4D19850-80EB-C04C-A1A6-3B2217F8D0AE}" type="datetimeFigureOut">
               <a:rPr lang="en-GB" smtClean="0"/>
-              <a:t>15/03/2024</a:t>
+              <a:t>18/03/2024</a:t>
             </a:fld>
             <a:endParaRPr lang="en-GB"/>
           </a:p>
@@ -1400,7 +1406,7 @@
           <a:p>
             <a:fld id="{E4D19850-80EB-C04C-A1A6-3B2217F8D0AE}" type="datetimeFigureOut">
               <a:rPr lang="en-GB" smtClean="0"/>
-              <a:t>15/03/2024</a:t>
+              <a:t>18/03/2024</a:t>
             </a:fld>
             <a:endParaRPr lang="en-GB"/>
           </a:p>
@@ -1812,7 +1818,7 @@
           <a:p>
             <a:fld id="{E4D19850-80EB-C04C-A1A6-3B2217F8D0AE}" type="datetimeFigureOut">
               <a:rPr lang="en-GB" smtClean="0"/>
-              <a:t>15/03/2024</a:t>
+              <a:t>18/03/2024</a:t>
             </a:fld>
             <a:endParaRPr lang="en-GB"/>
           </a:p>
@@ -1953,7 +1959,7 @@
           <a:p>
             <a:fld id="{E4D19850-80EB-C04C-A1A6-3B2217F8D0AE}" type="datetimeFigureOut">
               <a:rPr lang="en-GB" smtClean="0"/>
-              <a:t>15/03/2024</a:t>
+              <a:t>18/03/2024</a:t>
             </a:fld>
             <a:endParaRPr lang="en-GB"/>
           </a:p>
@@ -2066,7 +2072,7 @@
           <a:p>
             <a:fld id="{E4D19850-80EB-C04C-A1A6-3B2217F8D0AE}" type="datetimeFigureOut">
               <a:rPr lang="en-GB" smtClean="0"/>
-              <a:t>15/03/2024</a:t>
+              <a:t>18/03/2024</a:t>
             </a:fld>
             <a:endParaRPr lang="en-GB"/>
           </a:p>
@@ -2377,7 +2383,7 @@
           <a:p>
             <a:fld id="{E4D19850-80EB-C04C-A1A6-3B2217F8D0AE}" type="datetimeFigureOut">
               <a:rPr lang="en-GB" smtClean="0"/>
-              <a:t>15/03/2024</a:t>
+              <a:t>18/03/2024</a:t>
             </a:fld>
             <a:endParaRPr lang="en-GB"/>
           </a:p>
@@ -2665,7 +2671,7 @@
           <a:p>
             <a:fld id="{E4D19850-80EB-C04C-A1A6-3B2217F8D0AE}" type="datetimeFigureOut">
               <a:rPr lang="en-GB" smtClean="0"/>
-              <a:t>15/03/2024</a:t>
+              <a:t>18/03/2024</a:t>
             </a:fld>
             <a:endParaRPr lang="en-GB"/>
           </a:p>
@@ -2906,7 +2912,7 @@
           <a:p>
             <a:fld id="{E4D19850-80EB-C04C-A1A6-3B2217F8D0AE}" type="datetimeFigureOut">
               <a:rPr lang="en-GB" smtClean="0"/>
-              <a:t>15/03/2024</a:t>
+              <a:t>18/03/2024</a:t>
             </a:fld>
             <a:endParaRPr lang="en-GB"/>
           </a:p>
@@ -4515,6 +4521,145 @@
 </p:sld>
 </file>
 
+<file path=ppt/slides/slide4.xml><?xml version="1.0" encoding="utf-8"?>
+<p:sld xmlns:a="http://schemas.openxmlformats.org/drawingml/2006/main" xmlns:r="http://schemas.openxmlformats.org/officeDocument/2006/relationships" xmlns:p="http://schemas.openxmlformats.org/presentationml/2006/main">
+  <p:cSld>
+    <p:spTree>
+      <p:nvGrpSpPr>
+        <p:cNvPr id="1" name=""/>
+        <p:cNvGrpSpPr/>
+        <p:nvPr/>
+      </p:nvGrpSpPr>
+      <p:grpSpPr>
+        <a:xfrm>
+          <a:off x="0" y="0"/>
+          <a:ext cx="0" cy="0"/>
+          <a:chOff x="0" y="0"/>
+          <a:chExt cx="0" cy="0"/>
+        </a:xfrm>
+      </p:grpSpPr>
+      <p:sp>
+        <p:nvSpPr>
+          <p:cNvPr id="2" name="Title 1">
+            <a:extLst>
+              <a:ext uri="{FF2B5EF4-FFF2-40B4-BE49-F238E27FC236}">
+                <a16:creationId xmlns:a16="http://schemas.microsoft.com/office/drawing/2014/main" id="{3EC77A79-B090-1F09-90AD-4208C17843C2}"/>
+              </a:ext>
+            </a:extLst>
+          </p:cNvPr>
+          <p:cNvSpPr>
+            <a:spLocks noGrp="1"/>
+          </p:cNvSpPr>
+          <p:nvPr>
+            <p:ph type="ctrTitle"/>
+          </p:nvPr>
+        </p:nvSpPr>
+        <p:spPr/>
+        <p:txBody>
+          <a:bodyPr/>
+          <a:lstStyle/>
+          <a:p>
+            <a:r>
+              <a:rPr lang="en-GB" dirty="0"/>
+              <a:t>Cox Models</a:t>
+            </a:r>
+          </a:p>
+        </p:txBody>
+      </p:sp>
+      <p:sp>
+        <p:nvSpPr>
+          <p:cNvPr id="3" name="Subtitle 2">
+            <a:extLst>
+              <a:ext uri="{FF2B5EF4-FFF2-40B4-BE49-F238E27FC236}">
+                <a16:creationId xmlns:a16="http://schemas.microsoft.com/office/drawing/2014/main" id="{05BDB5C5-B277-C683-4083-0EA32FA05947}"/>
+              </a:ext>
+            </a:extLst>
+          </p:cNvPr>
+          <p:cNvSpPr>
+            <a:spLocks noGrp="1"/>
+          </p:cNvSpPr>
+          <p:nvPr>
+            <p:ph type="subTitle" idx="1"/>
+          </p:nvPr>
+        </p:nvSpPr>
+        <p:spPr/>
+        <p:txBody>
+          <a:bodyPr>
+            <a:normAutofit lnSpcReduction="10000"/>
+          </a:bodyPr>
+          <a:lstStyle/>
+          <a:p>
+            <a:pPr marL="457200" indent="-457200" algn="l">
+              <a:buFont typeface="+mj-lt"/>
+              <a:buAutoNum type="arabicPeriod"/>
+            </a:pPr>
+            <a:r>
+              <a:rPr lang="en-GB" dirty="0"/>
+              <a:t>Table of univariable factors</a:t>
+            </a:r>
+          </a:p>
+          <a:p>
+            <a:pPr marL="457200" indent="-457200" algn="l">
+              <a:buFont typeface="+mj-lt"/>
+              <a:buAutoNum type="arabicPeriod"/>
+            </a:pPr>
+            <a:r>
+              <a:rPr lang="en-GB" dirty="0"/>
+              <a:t>Clinical hazards ratio and Kaplan-Meier curves</a:t>
+            </a:r>
+          </a:p>
+          <a:p>
+            <a:pPr marL="457200" indent="-457200" algn="l">
+              <a:buFont typeface="+mj-lt"/>
+              <a:buAutoNum type="arabicPeriod"/>
+            </a:pPr>
+            <a:r>
+              <a:rPr lang="en-GB" dirty="0" err="1"/>
+              <a:t>Synthseg</a:t>
+            </a:r>
+            <a:r>
+              <a:rPr lang="en-GB" dirty="0"/>
+              <a:t> hazards ratios and Kaplan-</a:t>
+            </a:r>
+            <a:r>
+              <a:rPr lang="en-GB" dirty="0" err="1"/>
+              <a:t>meier</a:t>
+            </a:r>
+            <a:r>
+              <a:rPr lang="en-GB" dirty="0"/>
+              <a:t> curves</a:t>
+            </a:r>
+          </a:p>
+          <a:p>
+            <a:pPr marL="457200" indent="-457200" algn="l">
+              <a:buFont typeface="+mj-lt"/>
+              <a:buAutoNum type="arabicPeriod"/>
+            </a:pPr>
+            <a:r>
+              <a:rPr lang="en-GB" dirty="0"/>
+              <a:t>Multimodal </a:t>
+            </a:r>
+            <a:r>
+              <a:rPr lang="en-GB"/>
+              <a:t>hazards ratios</a:t>
+            </a:r>
+            <a:endParaRPr lang="en-GB" dirty="0"/>
+          </a:p>
+        </p:txBody>
+      </p:sp>
+    </p:spTree>
+    <p:extLst>
+      <p:ext uri="{BB962C8B-B14F-4D97-AF65-F5344CB8AC3E}">
+        <p14:creationId xmlns:p14="http://schemas.microsoft.com/office/powerpoint/2010/main" val="3640822484"/>
+      </p:ext>
+    </p:extLst>
+  </p:cSld>
+  <p:clrMapOvr>
+    <a:masterClrMapping/>
+  </p:clrMapOvr>
+</p:sld>
+</file>
+
 <file path=ppt/theme/theme1.xml><?xml version="1.0" encoding="utf-8"?>
 <a:theme xmlns:a="http://schemas.openxmlformats.org/drawingml/2006/main" name="Office Theme">
   <a:themeElements>

</xml_diff>

<commit_message>
written methods section of Cox models
</commit_message>
<xml_diff>
--- a/upgrade figures.pptx
+++ b/upgrade figures.pptx
@@ -4,6 +4,9 @@
   <p:sldMasterIdLst>
     <p:sldMasterId id="2147483648" r:id="rId1"/>
   </p:sldMasterIdLst>
+  <p:notesMasterIdLst>
+    <p:notesMasterId r:id="rId6"/>
+  </p:notesMasterIdLst>
   <p:sldIdLst>
     <p:sldId id="257" r:id="rId2"/>
     <p:sldId id="256" r:id="rId3"/>
@@ -115,6 +118,439 @@
 </p:presentation>
 </file>
 
+<file path=ppt/notesMasters/notesMaster1.xml><?xml version="1.0" encoding="utf-8"?>
+<p:notesMaster xmlns:a="http://schemas.openxmlformats.org/drawingml/2006/main" xmlns:r="http://schemas.openxmlformats.org/officeDocument/2006/relationships" xmlns:p="http://schemas.openxmlformats.org/presentationml/2006/main">
+  <p:cSld>
+    <p:bg>
+      <p:bgRef idx="1001">
+        <a:schemeClr val="bg1"/>
+      </p:bgRef>
+    </p:bg>
+    <p:spTree>
+      <p:nvGrpSpPr>
+        <p:cNvPr id="1" name=""/>
+        <p:cNvGrpSpPr/>
+        <p:nvPr/>
+      </p:nvGrpSpPr>
+      <p:grpSpPr>
+        <a:xfrm>
+          <a:off x="0" y="0"/>
+          <a:ext cx="0" cy="0"/>
+          <a:chOff x="0" y="0"/>
+          <a:chExt cx="0" cy="0"/>
+        </a:xfrm>
+      </p:grpSpPr>
+      <p:sp>
+        <p:nvSpPr>
+          <p:cNvPr id="2" name="Header Placeholder 1"/>
+          <p:cNvSpPr>
+            <a:spLocks noGrp="1"/>
+          </p:cNvSpPr>
+          <p:nvPr>
+            <p:ph type="hdr" sz="quarter"/>
+          </p:nvPr>
+        </p:nvSpPr>
+        <p:spPr>
+          <a:xfrm>
+            <a:off x="0" y="0"/>
+            <a:ext cx="2971800" cy="458788"/>
+          </a:xfrm>
+          <a:prstGeom prst="rect">
+            <a:avLst/>
+          </a:prstGeom>
+        </p:spPr>
+        <p:txBody>
+          <a:bodyPr vert="horz" lIns="91440" tIns="45720" rIns="91440" bIns="45720" rtlCol="0"/>
+          <a:lstStyle>
+            <a:lvl1pPr algn="l">
+              <a:defRPr sz="1200"/>
+            </a:lvl1pPr>
+          </a:lstStyle>
+          <a:p>
+            <a:endParaRPr lang="en-GB"/>
+          </a:p>
+        </p:txBody>
+      </p:sp>
+      <p:sp>
+        <p:nvSpPr>
+          <p:cNvPr id="3" name="Date Placeholder 2"/>
+          <p:cNvSpPr>
+            <a:spLocks noGrp="1"/>
+          </p:cNvSpPr>
+          <p:nvPr>
+            <p:ph type="dt" idx="1"/>
+          </p:nvPr>
+        </p:nvSpPr>
+        <p:spPr>
+          <a:xfrm>
+            <a:off x="3884613" y="0"/>
+            <a:ext cx="2971800" cy="458788"/>
+          </a:xfrm>
+          <a:prstGeom prst="rect">
+            <a:avLst/>
+          </a:prstGeom>
+        </p:spPr>
+        <p:txBody>
+          <a:bodyPr vert="horz" lIns="91440" tIns="45720" rIns="91440" bIns="45720" rtlCol="0"/>
+          <a:lstStyle>
+            <a:lvl1pPr algn="r">
+              <a:defRPr sz="1200"/>
+            </a:lvl1pPr>
+          </a:lstStyle>
+          <a:p>
+            <a:fld id="{CECEA2D8-CBAA-1E4A-AA09-141BFA2CD374}" type="datetimeFigureOut">
+              <a:rPr lang="en-GB" smtClean="0"/>
+              <a:t>19/03/2024</a:t>
+            </a:fld>
+            <a:endParaRPr lang="en-GB"/>
+          </a:p>
+        </p:txBody>
+      </p:sp>
+      <p:sp>
+        <p:nvSpPr>
+          <p:cNvPr id="4" name="Slide Image Placeholder 3"/>
+          <p:cNvSpPr>
+            <a:spLocks noGrp="1" noRot="1" noChangeAspect="1"/>
+          </p:cNvSpPr>
+          <p:nvPr>
+            <p:ph type="sldImg" idx="2"/>
+          </p:nvPr>
+        </p:nvSpPr>
+        <p:spPr>
+          <a:xfrm>
+            <a:off x="685800" y="1143000"/>
+            <a:ext cx="5486400" cy="3086100"/>
+          </a:xfrm>
+          <a:prstGeom prst="rect">
+            <a:avLst/>
+          </a:prstGeom>
+          <a:noFill/>
+          <a:ln w="12700">
+            <a:solidFill>
+              <a:prstClr val="black"/>
+            </a:solidFill>
+          </a:ln>
+        </p:spPr>
+        <p:txBody>
+          <a:bodyPr vert="horz" lIns="91440" tIns="45720" rIns="91440" bIns="45720" rtlCol="0" anchor="ctr"/>
+          <a:lstStyle/>
+          <a:p>
+            <a:endParaRPr lang="en-GB"/>
+          </a:p>
+        </p:txBody>
+      </p:sp>
+      <p:sp>
+        <p:nvSpPr>
+          <p:cNvPr id="5" name="Notes Placeholder 4"/>
+          <p:cNvSpPr>
+            <a:spLocks noGrp="1"/>
+          </p:cNvSpPr>
+          <p:nvPr>
+            <p:ph type="body" sz="quarter" idx="3"/>
+          </p:nvPr>
+        </p:nvSpPr>
+        <p:spPr>
+          <a:xfrm>
+            <a:off x="685800" y="4400550"/>
+            <a:ext cx="5486400" cy="3600450"/>
+          </a:xfrm>
+          <a:prstGeom prst="rect">
+            <a:avLst/>
+          </a:prstGeom>
+        </p:spPr>
+        <p:txBody>
+          <a:bodyPr vert="horz" lIns="91440" tIns="45720" rIns="91440" bIns="45720" rtlCol="0"/>
+          <a:lstStyle/>
+          <a:p>
+            <a:pPr lvl="0"/>
+            <a:r>
+              <a:rPr lang="en-GB"/>
+              <a:t>Click to edit Master text styles</a:t>
+            </a:r>
+          </a:p>
+          <a:p>
+            <a:pPr lvl="1"/>
+            <a:r>
+              <a:rPr lang="en-GB"/>
+              <a:t>Second level</a:t>
+            </a:r>
+          </a:p>
+          <a:p>
+            <a:pPr lvl="2"/>
+            <a:r>
+              <a:rPr lang="en-GB"/>
+              <a:t>Third level</a:t>
+            </a:r>
+          </a:p>
+          <a:p>
+            <a:pPr lvl="3"/>
+            <a:r>
+              <a:rPr lang="en-GB"/>
+              <a:t>Fourth level</a:t>
+            </a:r>
+          </a:p>
+          <a:p>
+            <a:pPr lvl="4"/>
+            <a:r>
+              <a:rPr lang="en-GB"/>
+              <a:t>Fifth level</a:t>
+            </a:r>
+          </a:p>
+        </p:txBody>
+      </p:sp>
+      <p:sp>
+        <p:nvSpPr>
+          <p:cNvPr id="6" name="Footer Placeholder 5"/>
+          <p:cNvSpPr>
+            <a:spLocks noGrp="1"/>
+          </p:cNvSpPr>
+          <p:nvPr>
+            <p:ph type="ftr" sz="quarter" idx="4"/>
+          </p:nvPr>
+        </p:nvSpPr>
+        <p:spPr>
+          <a:xfrm>
+            <a:off x="0" y="8685213"/>
+            <a:ext cx="2971800" cy="458787"/>
+          </a:xfrm>
+          <a:prstGeom prst="rect">
+            <a:avLst/>
+          </a:prstGeom>
+        </p:spPr>
+        <p:txBody>
+          <a:bodyPr vert="horz" lIns="91440" tIns="45720" rIns="91440" bIns="45720" rtlCol="0" anchor="b"/>
+          <a:lstStyle>
+            <a:lvl1pPr algn="l">
+              <a:defRPr sz="1200"/>
+            </a:lvl1pPr>
+          </a:lstStyle>
+          <a:p>
+            <a:endParaRPr lang="en-GB"/>
+          </a:p>
+        </p:txBody>
+      </p:sp>
+      <p:sp>
+        <p:nvSpPr>
+          <p:cNvPr id="7" name="Slide Number Placeholder 6"/>
+          <p:cNvSpPr>
+            <a:spLocks noGrp="1"/>
+          </p:cNvSpPr>
+          <p:nvPr>
+            <p:ph type="sldNum" sz="quarter" idx="5"/>
+          </p:nvPr>
+        </p:nvSpPr>
+        <p:spPr>
+          <a:xfrm>
+            <a:off x="3884613" y="8685213"/>
+            <a:ext cx="2971800" cy="458787"/>
+          </a:xfrm>
+          <a:prstGeom prst="rect">
+            <a:avLst/>
+          </a:prstGeom>
+        </p:spPr>
+        <p:txBody>
+          <a:bodyPr vert="horz" lIns="91440" tIns="45720" rIns="91440" bIns="45720" rtlCol="0" anchor="b"/>
+          <a:lstStyle>
+            <a:lvl1pPr algn="r">
+              <a:defRPr sz="1200"/>
+            </a:lvl1pPr>
+          </a:lstStyle>
+          <a:p>
+            <a:fld id="{466AC267-C18B-E84D-9604-8DC72C069D4E}" type="slidenum">
+              <a:rPr lang="en-GB" smtClean="0"/>
+              <a:t>‹#›</a:t>
+            </a:fld>
+            <a:endParaRPr lang="en-GB"/>
+          </a:p>
+        </p:txBody>
+      </p:sp>
+    </p:spTree>
+    <p:extLst>
+      <p:ext uri="{BB962C8B-B14F-4D97-AF65-F5344CB8AC3E}">
+        <p14:creationId xmlns:p14="http://schemas.microsoft.com/office/powerpoint/2010/main" val="4075876677"/>
+      </p:ext>
+    </p:extLst>
+  </p:cSld>
+  <p:clrMap bg1="lt1" tx1="dk1" bg2="lt2" tx2="dk2" accent1="accent1" accent2="accent2" accent3="accent3" accent4="accent4" accent5="accent5" accent6="accent6" hlink="hlink" folHlink="folHlink"/>
+  <p:notesStyle>
+    <a:lvl1pPr marL="0" algn="l" defTabSz="914400" rtl="0" eaLnBrk="1" latinLnBrk="0" hangingPunct="1">
+      <a:defRPr sz="1200" kern="1200">
+        <a:solidFill>
+          <a:schemeClr val="tx1"/>
+        </a:solidFill>
+        <a:latin typeface="+mn-lt"/>
+        <a:ea typeface="+mn-ea"/>
+        <a:cs typeface="+mn-cs"/>
+      </a:defRPr>
+    </a:lvl1pPr>
+    <a:lvl2pPr marL="457200" algn="l" defTabSz="914400" rtl="0" eaLnBrk="1" latinLnBrk="0" hangingPunct="1">
+      <a:defRPr sz="1200" kern="1200">
+        <a:solidFill>
+          <a:schemeClr val="tx1"/>
+        </a:solidFill>
+        <a:latin typeface="+mn-lt"/>
+        <a:ea typeface="+mn-ea"/>
+        <a:cs typeface="+mn-cs"/>
+      </a:defRPr>
+    </a:lvl2pPr>
+    <a:lvl3pPr marL="914400" algn="l" defTabSz="914400" rtl="0" eaLnBrk="1" latinLnBrk="0" hangingPunct="1">
+      <a:defRPr sz="1200" kern="1200">
+        <a:solidFill>
+          <a:schemeClr val="tx1"/>
+        </a:solidFill>
+        <a:latin typeface="+mn-lt"/>
+        <a:ea typeface="+mn-ea"/>
+        <a:cs typeface="+mn-cs"/>
+      </a:defRPr>
+    </a:lvl3pPr>
+    <a:lvl4pPr marL="1371600" algn="l" defTabSz="914400" rtl="0" eaLnBrk="1" latinLnBrk="0" hangingPunct="1">
+      <a:defRPr sz="1200" kern="1200">
+        <a:solidFill>
+          <a:schemeClr val="tx1"/>
+        </a:solidFill>
+        <a:latin typeface="+mn-lt"/>
+        <a:ea typeface="+mn-ea"/>
+        <a:cs typeface="+mn-cs"/>
+      </a:defRPr>
+    </a:lvl4pPr>
+    <a:lvl5pPr marL="1828800" algn="l" defTabSz="914400" rtl="0" eaLnBrk="1" latinLnBrk="0" hangingPunct="1">
+      <a:defRPr sz="1200" kern="1200">
+        <a:solidFill>
+          <a:schemeClr val="tx1"/>
+        </a:solidFill>
+        <a:latin typeface="+mn-lt"/>
+        <a:ea typeface="+mn-ea"/>
+        <a:cs typeface="+mn-cs"/>
+      </a:defRPr>
+    </a:lvl5pPr>
+    <a:lvl6pPr marL="2286000" algn="l" defTabSz="914400" rtl="0" eaLnBrk="1" latinLnBrk="0" hangingPunct="1">
+      <a:defRPr sz="1200" kern="1200">
+        <a:solidFill>
+          <a:schemeClr val="tx1"/>
+        </a:solidFill>
+        <a:latin typeface="+mn-lt"/>
+        <a:ea typeface="+mn-ea"/>
+        <a:cs typeface="+mn-cs"/>
+      </a:defRPr>
+    </a:lvl6pPr>
+    <a:lvl7pPr marL="2743200" algn="l" defTabSz="914400" rtl="0" eaLnBrk="1" latinLnBrk="0" hangingPunct="1">
+      <a:defRPr sz="1200" kern="1200">
+        <a:solidFill>
+          <a:schemeClr val="tx1"/>
+        </a:solidFill>
+        <a:latin typeface="+mn-lt"/>
+        <a:ea typeface="+mn-ea"/>
+        <a:cs typeface="+mn-cs"/>
+      </a:defRPr>
+    </a:lvl7pPr>
+    <a:lvl8pPr marL="3200400" algn="l" defTabSz="914400" rtl="0" eaLnBrk="1" latinLnBrk="0" hangingPunct="1">
+      <a:defRPr sz="1200" kern="1200">
+        <a:solidFill>
+          <a:schemeClr val="tx1"/>
+        </a:solidFill>
+        <a:latin typeface="+mn-lt"/>
+        <a:ea typeface="+mn-ea"/>
+        <a:cs typeface="+mn-cs"/>
+      </a:defRPr>
+    </a:lvl8pPr>
+    <a:lvl9pPr marL="3657600" algn="l" defTabSz="914400" rtl="0" eaLnBrk="1" latinLnBrk="0" hangingPunct="1">
+      <a:defRPr sz="1200" kern="1200">
+        <a:solidFill>
+          <a:schemeClr val="tx1"/>
+        </a:solidFill>
+        <a:latin typeface="+mn-lt"/>
+        <a:ea typeface="+mn-ea"/>
+        <a:cs typeface="+mn-cs"/>
+      </a:defRPr>
+    </a:lvl9pPr>
+  </p:notesStyle>
+</p:notesMaster>
+</file>
+
+<file path=ppt/notesSlides/notesSlide1.xml><?xml version="1.0" encoding="utf-8"?>
+<p:notes xmlns:a="http://schemas.openxmlformats.org/drawingml/2006/main" xmlns:r="http://schemas.openxmlformats.org/officeDocument/2006/relationships" xmlns:p="http://schemas.openxmlformats.org/presentationml/2006/main">
+  <p:cSld>
+    <p:spTree>
+      <p:nvGrpSpPr>
+        <p:cNvPr id="1" name=""/>
+        <p:cNvGrpSpPr/>
+        <p:nvPr/>
+      </p:nvGrpSpPr>
+      <p:grpSpPr>
+        <a:xfrm>
+          <a:off x="0" y="0"/>
+          <a:ext cx="0" cy="0"/>
+          <a:chOff x="0" y="0"/>
+          <a:chExt cx="0" cy="0"/>
+        </a:xfrm>
+      </p:grpSpPr>
+      <p:sp>
+        <p:nvSpPr>
+          <p:cNvPr id="2" name="Slide Image Placeholder 1"/>
+          <p:cNvSpPr>
+            <a:spLocks noGrp="1" noRot="1" noChangeAspect="1"/>
+          </p:cNvSpPr>
+          <p:nvPr>
+            <p:ph type="sldImg"/>
+          </p:nvPr>
+        </p:nvSpPr>
+        <p:spPr/>
+      </p:sp>
+      <p:sp>
+        <p:nvSpPr>
+          <p:cNvPr id="3" name="Notes Placeholder 2"/>
+          <p:cNvSpPr>
+            <a:spLocks noGrp="1"/>
+          </p:cNvSpPr>
+          <p:nvPr>
+            <p:ph type="body" idx="1"/>
+          </p:nvPr>
+        </p:nvSpPr>
+        <p:spPr/>
+        <p:txBody>
+          <a:bodyPr/>
+          <a:lstStyle/>
+          <a:p>
+            <a:endParaRPr lang="en-GB" dirty="0"/>
+          </a:p>
+        </p:txBody>
+      </p:sp>
+      <p:sp>
+        <p:nvSpPr>
+          <p:cNvPr id="4" name="Slide Number Placeholder 3"/>
+          <p:cNvSpPr>
+            <a:spLocks noGrp="1"/>
+          </p:cNvSpPr>
+          <p:nvPr>
+            <p:ph type="sldNum" sz="quarter" idx="5"/>
+          </p:nvPr>
+        </p:nvSpPr>
+        <p:spPr/>
+        <p:txBody>
+          <a:bodyPr/>
+          <a:lstStyle/>
+          <a:p>
+            <a:fld id="{466AC267-C18B-E84D-9604-8DC72C069D4E}" type="slidenum">
+              <a:rPr lang="en-GB" smtClean="0"/>
+              <a:t>4</a:t>
+            </a:fld>
+            <a:endParaRPr lang="en-GB"/>
+          </a:p>
+        </p:txBody>
+      </p:sp>
+    </p:spTree>
+    <p:extLst>
+      <p:ext uri="{BB962C8B-B14F-4D97-AF65-F5344CB8AC3E}">
+        <p14:creationId xmlns:p14="http://schemas.microsoft.com/office/powerpoint/2010/main" val="2385997429"/>
+      </p:ext>
+    </p:extLst>
+  </p:cSld>
+  <p:clrMapOvr>
+    <a:masterClrMapping/>
+  </p:clrMapOvr>
+</p:notes>
+</file>
+
 <file path=ppt/slideLayouts/slideLayout1.xml><?xml version="1.0" encoding="utf-8"?>
 <p:sldLayout xmlns:a="http://schemas.openxmlformats.org/drawingml/2006/main" xmlns:r="http://schemas.openxmlformats.org/officeDocument/2006/relationships" xmlns:p="http://schemas.openxmlformats.org/presentationml/2006/main" type="title" preserve="1">
   <p:cSld name="Title Slide">
@@ -262,7 +698,7 @@
           <a:p>
             <a:fld id="{E4D19850-80EB-C04C-A1A6-3B2217F8D0AE}" type="datetimeFigureOut">
               <a:rPr lang="en-GB" smtClean="0"/>
-              <a:t>18/03/2024</a:t>
+              <a:t>19/03/2024</a:t>
             </a:fld>
             <a:endParaRPr lang="en-GB"/>
           </a:p>
@@ -460,7 +896,7 @@
           <a:p>
             <a:fld id="{E4D19850-80EB-C04C-A1A6-3B2217F8D0AE}" type="datetimeFigureOut">
               <a:rPr lang="en-GB" smtClean="0"/>
-              <a:t>18/03/2024</a:t>
+              <a:t>19/03/2024</a:t>
             </a:fld>
             <a:endParaRPr lang="en-GB"/>
           </a:p>
@@ -668,7 +1104,7 @@
           <a:p>
             <a:fld id="{E4D19850-80EB-C04C-A1A6-3B2217F8D0AE}" type="datetimeFigureOut">
               <a:rPr lang="en-GB" smtClean="0"/>
-              <a:t>18/03/2024</a:t>
+              <a:t>19/03/2024</a:t>
             </a:fld>
             <a:endParaRPr lang="en-GB"/>
           </a:p>
@@ -866,7 +1302,7 @@
           <a:p>
             <a:fld id="{E4D19850-80EB-C04C-A1A6-3B2217F8D0AE}" type="datetimeFigureOut">
               <a:rPr lang="en-GB" smtClean="0"/>
-              <a:t>18/03/2024</a:t>
+              <a:t>19/03/2024</a:t>
             </a:fld>
             <a:endParaRPr lang="en-GB"/>
           </a:p>
@@ -1141,7 +1577,7 @@
           <a:p>
             <a:fld id="{E4D19850-80EB-C04C-A1A6-3B2217F8D0AE}" type="datetimeFigureOut">
               <a:rPr lang="en-GB" smtClean="0"/>
-              <a:t>18/03/2024</a:t>
+              <a:t>19/03/2024</a:t>
             </a:fld>
             <a:endParaRPr lang="en-GB"/>
           </a:p>
@@ -1406,7 +1842,7 @@
           <a:p>
             <a:fld id="{E4D19850-80EB-C04C-A1A6-3B2217F8D0AE}" type="datetimeFigureOut">
               <a:rPr lang="en-GB" smtClean="0"/>
-              <a:t>18/03/2024</a:t>
+              <a:t>19/03/2024</a:t>
             </a:fld>
             <a:endParaRPr lang="en-GB"/>
           </a:p>
@@ -1818,7 +2254,7 @@
           <a:p>
             <a:fld id="{E4D19850-80EB-C04C-A1A6-3B2217F8D0AE}" type="datetimeFigureOut">
               <a:rPr lang="en-GB" smtClean="0"/>
-              <a:t>18/03/2024</a:t>
+              <a:t>19/03/2024</a:t>
             </a:fld>
             <a:endParaRPr lang="en-GB"/>
           </a:p>
@@ -1959,7 +2395,7 @@
           <a:p>
             <a:fld id="{E4D19850-80EB-C04C-A1A6-3B2217F8D0AE}" type="datetimeFigureOut">
               <a:rPr lang="en-GB" smtClean="0"/>
-              <a:t>18/03/2024</a:t>
+              <a:t>19/03/2024</a:t>
             </a:fld>
             <a:endParaRPr lang="en-GB"/>
           </a:p>
@@ -2072,7 +2508,7 @@
           <a:p>
             <a:fld id="{E4D19850-80EB-C04C-A1A6-3B2217F8D0AE}" type="datetimeFigureOut">
               <a:rPr lang="en-GB" smtClean="0"/>
-              <a:t>18/03/2024</a:t>
+              <a:t>19/03/2024</a:t>
             </a:fld>
             <a:endParaRPr lang="en-GB"/>
           </a:p>
@@ -2383,7 +2819,7 @@
           <a:p>
             <a:fld id="{E4D19850-80EB-C04C-A1A6-3B2217F8D0AE}" type="datetimeFigureOut">
               <a:rPr lang="en-GB" smtClean="0"/>
-              <a:t>18/03/2024</a:t>
+              <a:t>19/03/2024</a:t>
             </a:fld>
             <a:endParaRPr lang="en-GB"/>
           </a:p>
@@ -2671,7 +3107,7 @@
           <a:p>
             <a:fld id="{E4D19850-80EB-C04C-A1A6-3B2217F8D0AE}" type="datetimeFigureOut">
               <a:rPr lang="en-GB" smtClean="0"/>
-              <a:t>18/03/2024</a:t>
+              <a:t>19/03/2024</a:t>
             </a:fld>
             <a:endParaRPr lang="en-GB"/>
           </a:p>
@@ -2912,7 +3348,7 @@
           <a:p>
             <a:fld id="{E4D19850-80EB-C04C-A1A6-3B2217F8D0AE}" type="datetimeFigureOut">
               <a:rPr lang="en-GB" smtClean="0"/>
-              <a:t>18/03/2024</a:t>
+              <a:t>19/03/2024</a:t>
             </a:fld>
             <a:endParaRPr lang="en-GB"/>
           </a:p>
@@ -4585,7 +5021,7 @@
         <p:spPr/>
         <p:txBody>
           <a:bodyPr>
-            <a:normAutofit lnSpcReduction="10000"/>
+            <a:normAutofit/>
           </a:bodyPr>
           <a:lstStyle/>
           <a:p>
@@ -4595,7 +5031,7 @@
             </a:pPr>
             <a:r>
               <a:rPr lang="en-GB" dirty="0"/>
-              <a:t>Table of univariable factors</a:t>
+              <a:t>Table of factors for all models</a:t>
             </a:r>
           </a:p>
           <a:p>
@@ -4605,7 +5041,15 @@
             </a:pPr>
             <a:r>
               <a:rPr lang="en-GB" dirty="0"/>
-              <a:t>Clinical hazards ratio and Kaplan-Meier curves</a:t>
+              <a:t>Kaplan </a:t>
+            </a:r>
+            <a:r>
+              <a:rPr lang="en-GB" dirty="0" err="1"/>
+              <a:t>meier</a:t>
+            </a:r>
+            <a:r>
+              <a:rPr lang="en-GB" dirty="0"/>
+              <a:t> curves for significant factors in all models</a:t>
             </a:r>
           </a:p>
           <a:p>
@@ -4614,39 +5058,42 @@
               <a:buAutoNum type="arabicPeriod"/>
             </a:pPr>
             <a:r>
-              <a:rPr lang="en-GB" dirty="0" err="1"/>
-              <a:t>Synthseg</a:t>
-            </a:r>
-            <a:r>
               <a:rPr lang="en-GB" dirty="0"/>
-              <a:t> hazards ratios and Kaplan-</a:t>
-            </a:r>
-            <a:r>
-              <a:rPr lang="en-GB" dirty="0" err="1"/>
-              <a:t>meier</a:t>
-            </a:r>
-            <a:r>
-              <a:rPr lang="en-GB" dirty="0"/>
-              <a:t> curves</a:t>
-            </a:r>
-          </a:p>
-          <a:p>
-            <a:pPr marL="457200" indent="-457200" algn="l">
-              <a:buFont typeface="+mj-lt"/>
-              <a:buAutoNum type="arabicPeriod"/>
-            </a:pPr>
-            <a:r>
-              <a:rPr lang="en-GB" dirty="0"/>
-              <a:t>Multimodal </a:t>
-            </a:r>
-            <a:r>
-              <a:rPr lang="en-GB"/>
-              <a:t>hazards ratios</a:t>
-            </a:r>
-            <a:endParaRPr lang="en-GB" dirty="0"/>
-          </a:p>
-        </p:txBody>
-      </p:sp>
+              <a:t>Table of fit statistics</a:t>
+            </a:r>
+          </a:p>
+        </p:txBody>
+      </p:sp>
+      <p:pic>
+        <p:nvPicPr>
+          <p:cNvPr id="5" name="Picture 4" descr="A table of medical statistics&#10;&#10;Description automatically generated with medium confidence">
+            <a:extLst>
+              <a:ext uri="{FF2B5EF4-FFF2-40B4-BE49-F238E27FC236}">
+                <a16:creationId xmlns:a16="http://schemas.microsoft.com/office/drawing/2014/main" id="{D1414BD1-05C6-DAAD-D09E-EA819A20866F}"/>
+              </a:ext>
+            </a:extLst>
+          </p:cNvPr>
+          <p:cNvPicPr>
+            <a:picLocks noChangeAspect="1"/>
+          </p:cNvPicPr>
+          <p:nvPr/>
+        </p:nvPicPr>
+        <p:blipFill>
+          <a:blip r:embed="rId3"/>
+          <a:stretch>
+            <a:fillRect/>
+          </a:stretch>
+        </p:blipFill>
+        <p:spPr>
+          <a:xfrm>
+            <a:off x="7997465" y="127663"/>
+            <a:ext cx="4032347" cy="3659966"/>
+          </a:xfrm>
+          <a:prstGeom prst="rect">
+            <a:avLst/>
+          </a:prstGeom>
+        </p:spPr>
+      </p:pic>
     </p:spTree>
     <p:extLst>
       <p:ext uri="{BB962C8B-B14F-4D97-AF65-F5344CB8AC3E}">
@@ -4953,4 +5400,319 @@
     </a:ext>
   </a:extLst>
 </a:theme>
+</file>
+
+<file path=ppt/theme/theme2.xml><?xml version="1.0" encoding="utf-8"?>
+<a:theme xmlns:a="http://schemas.openxmlformats.org/drawingml/2006/main" name="Office Theme">
+  <a:themeElements>
+    <a:clrScheme name="Office">
+      <a:dk1>
+        <a:sysClr val="windowText" lastClr="000000"/>
+      </a:dk1>
+      <a:lt1>
+        <a:sysClr val="window" lastClr="FFFFFF"/>
+      </a:lt1>
+      <a:dk2>
+        <a:srgbClr val="0E2841"/>
+      </a:dk2>
+      <a:lt2>
+        <a:srgbClr val="E8E8E8"/>
+      </a:lt2>
+      <a:accent1>
+        <a:srgbClr val="156082"/>
+      </a:accent1>
+      <a:accent2>
+        <a:srgbClr val="E97132"/>
+      </a:accent2>
+      <a:accent3>
+        <a:srgbClr val="196B24"/>
+      </a:accent3>
+      <a:accent4>
+        <a:srgbClr val="0F9ED5"/>
+      </a:accent4>
+      <a:accent5>
+        <a:srgbClr val="A02B93"/>
+      </a:accent5>
+      <a:accent6>
+        <a:srgbClr val="4EA72E"/>
+      </a:accent6>
+      <a:hlink>
+        <a:srgbClr val="467886"/>
+      </a:hlink>
+      <a:folHlink>
+        <a:srgbClr val="96607D"/>
+      </a:folHlink>
+    </a:clrScheme>
+    <a:fontScheme name="Office">
+      <a:majorFont>
+        <a:latin typeface="Aptos Display" panose="02110004020202020204"/>
+        <a:ea typeface=""/>
+        <a:cs typeface=""/>
+        <a:font script="Jpan" typeface="游ゴシック Light"/>
+        <a:font script="Hang" typeface="맑은 고딕"/>
+        <a:font script="Hans" typeface="等线 Light"/>
+        <a:font script="Hant" typeface="新細明體"/>
+        <a:font script="Arab" typeface="Times New Roman"/>
+        <a:font script="Hebr" typeface="Times New Roman"/>
+        <a:font script="Thai" typeface="Angsana New"/>
+        <a:font script="Ethi" typeface="Nyala"/>
+        <a:font script="Beng" typeface="Vrinda"/>
+        <a:font script="Gujr" typeface="Shruti"/>
+        <a:font script="Khmr" typeface="MoolBoran"/>
+        <a:font script="Knda" typeface="Tunga"/>
+        <a:font script="Guru" typeface="Raavi"/>
+        <a:font script="Cans" typeface="Euphemia"/>
+        <a:font script="Cher" typeface="Plantagenet Cherokee"/>
+        <a:font script="Yiii" typeface="Microsoft Yi Baiti"/>
+        <a:font script="Tibt" typeface="Microsoft Himalaya"/>
+        <a:font script="Thaa" typeface="MV Boli"/>
+        <a:font script="Deva" typeface="Mangal"/>
+        <a:font script="Telu" typeface="Gautami"/>
+        <a:font script="Taml" typeface="Latha"/>
+        <a:font script="Syrc" typeface="Estrangelo Edessa"/>
+        <a:font script="Orya" typeface="Kalinga"/>
+        <a:font script="Mlym" typeface="Kartika"/>
+        <a:font script="Laoo" typeface="DokChampa"/>
+        <a:font script="Sinh" typeface="Iskoola Pota"/>
+        <a:font script="Mong" typeface="Mongolian Baiti"/>
+        <a:font script="Viet" typeface="Times New Roman"/>
+        <a:font script="Uigh" typeface="Microsoft Uighur"/>
+        <a:font script="Geor" typeface="Sylfaen"/>
+        <a:font script="Armn" typeface="Arial"/>
+        <a:font script="Bugi" typeface="Leelawadee UI"/>
+        <a:font script="Bopo" typeface="Microsoft JhengHei"/>
+        <a:font script="Java" typeface="Javanese Text"/>
+        <a:font script="Lisu" typeface="Segoe UI"/>
+        <a:font script="Mymr" typeface="Myanmar Text"/>
+        <a:font script="Nkoo" typeface="Ebrima"/>
+        <a:font script="Olck" typeface="Nirmala UI"/>
+        <a:font script="Osma" typeface="Ebrima"/>
+        <a:font script="Phag" typeface="Phagspa"/>
+        <a:font script="Syrn" typeface="Estrangelo Edessa"/>
+        <a:font script="Syrj" typeface="Estrangelo Edessa"/>
+        <a:font script="Syre" typeface="Estrangelo Edessa"/>
+        <a:font script="Sora" typeface="Nirmala UI"/>
+        <a:font script="Tale" typeface="Microsoft Tai Le"/>
+        <a:font script="Talu" typeface="Microsoft New Tai Lue"/>
+        <a:font script="Tfng" typeface="Ebrima"/>
+      </a:majorFont>
+      <a:minorFont>
+        <a:latin typeface="Aptos" panose="02110004020202020204"/>
+        <a:ea typeface=""/>
+        <a:cs typeface=""/>
+        <a:font script="Jpan" typeface="游ゴシック"/>
+        <a:font script="Hang" typeface="맑은 고딕"/>
+        <a:font script="Hans" typeface="等线"/>
+        <a:font script="Hant" typeface="新細明體"/>
+        <a:font script="Arab" typeface="Arial"/>
+        <a:font script="Hebr" typeface="Arial"/>
+        <a:font script="Thai" typeface="Cordia New"/>
+        <a:font script="Ethi" typeface="Nyala"/>
+        <a:font script="Beng" typeface="Vrinda"/>
+        <a:font script="Gujr" typeface="Shruti"/>
+        <a:font script="Khmr" typeface="DaunPenh"/>
+        <a:font script="Knda" typeface="Tunga"/>
+        <a:font script="Guru" typeface="Raavi"/>
+        <a:font script="Cans" typeface="Euphemia"/>
+        <a:font script="Cher" typeface="Plantagenet Cherokee"/>
+        <a:font script="Yiii" typeface="Microsoft Yi Baiti"/>
+        <a:font script="Tibt" typeface="Microsoft Himalaya"/>
+        <a:font script="Thaa" typeface="MV Boli"/>
+        <a:font script="Deva" typeface="Mangal"/>
+        <a:font script="Telu" typeface="Gautami"/>
+        <a:font script="Taml" typeface="Latha"/>
+        <a:font script="Syrc" typeface="Estrangelo Edessa"/>
+        <a:font script="Orya" typeface="Kalinga"/>
+        <a:font script="Mlym" typeface="Kartika"/>
+        <a:font script="Laoo" typeface="DokChampa"/>
+        <a:font script="Sinh" typeface="Iskoola Pota"/>
+        <a:font script="Mong" typeface="Mongolian Baiti"/>
+        <a:font script="Viet" typeface="Arial"/>
+        <a:font script="Uigh" typeface="Microsoft Uighur"/>
+        <a:font script="Geor" typeface="Sylfaen"/>
+        <a:font script="Armn" typeface="Arial"/>
+        <a:font script="Bugi" typeface="Leelawadee UI"/>
+        <a:font script="Bopo" typeface="Microsoft JhengHei"/>
+        <a:font script="Java" typeface="Javanese Text"/>
+        <a:font script="Lisu" typeface="Segoe UI"/>
+        <a:font script="Mymr" typeface="Myanmar Text"/>
+        <a:font script="Nkoo" typeface="Ebrima"/>
+        <a:font script="Olck" typeface="Nirmala UI"/>
+        <a:font script="Osma" typeface="Ebrima"/>
+        <a:font script="Phag" typeface="Phagspa"/>
+        <a:font script="Syrn" typeface="Estrangelo Edessa"/>
+        <a:font script="Syrj" typeface="Estrangelo Edessa"/>
+        <a:font script="Syre" typeface="Estrangelo Edessa"/>
+        <a:font script="Sora" typeface="Nirmala UI"/>
+        <a:font script="Tale" typeface="Microsoft Tai Le"/>
+        <a:font script="Talu" typeface="Microsoft New Tai Lue"/>
+        <a:font script="Tfng" typeface="Ebrima"/>
+      </a:minorFont>
+    </a:fontScheme>
+    <a:fmtScheme name="Office">
+      <a:fillStyleLst>
+        <a:solidFill>
+          <a:schemeClr val="phClr"/>
+        </a:solidFill>
+        <a:gradFill rotWithShape="1">
+          <a:gsLst>
+            <a:gs pos="0">
+              <a:schemeClr val="phClr">
+                <a:lumMod val="110000"/>
+                <a:satMod val="105000"/>
+                <a:tint val="67000"/>
+              </a:schemeClr>
+            </a:gs>
+            <a:gs pos="50000">
+              <a:schemeClr val="phClr">
+                <a:lumMod val="105000"/>
+                <a:satMod val="103000"/>
+                <a:tint val="73000"/>
+              </a:schemeClr>
+            </a:gs>
+            <a:gs pos="100000">
+              <a:schemeClr val="phClr">
+                <a:lumMod val="105000"/>
+                <a:satMod val="109000"/>
+                <a:tint val="81000"/>
+              </a:schemeClr>
+            </a:gs>
+          </a:gsLst>
+          <a:lin ang="5400000" scaled="0"/>
+        </a:gradFill>
+        <a:gradFill rotWithShape="1">
+          <a:gsLst>
+            <a:gs pos="0">
+              <a:schemeClr val="phClr">
+                <a:satMod val="103000"/>
+                <a:lumMod val="102000"/>
+                <a:tint val="94000"/>
+              </a:schemeClr>
+            </a:gs>
+            <a:gs pos="50000">
+              <a:schemeClr val="phClr">
+                <a:satMod val="110000"/>
+                <a:lumMod val="100000"/>
+                <a:shade val="100000"/>
+              </a:schemeClr>
+            </a:gs>
+            <a:gs pos="100000">
+              <a:schemeClr val="phClr">
+                <a:lumMod val="99000"/>
+                <a:satMod val="120000"/>
+                <a:shade val="78000"/>
+              </a:schemeClr>
+            </a:gs>
+          </a:gsLst>
+          <a:lin ang="5400000" scaled="0"/>
+        </a:gradFill>
+      </a:fillStyleLst>
+      <a:lnStyleLst>
+        <a:ln w="12700" cap="flat" cmpd="sng" algn="ctr">
+          <a:solidFill>
+            <a:schemeClr val="phClr"/>
+          </a:solidFill>
+          <a:prstDash val="solid"/>
+          <a:miter lim="800000"/>
+        </a:ln>
+        <a:ln w="19050" cap="flat" cmpd="sng" algn="ctr">
+          <a:solidFill>
+            <a:schemeClr val="phClr"/>
+          </a:solidFill>
+          <a:prstDash val="solid"/>
+          <a:miter lim="800000"/>
+        </a:ln>
+        <a:ln w="25400" cap="flat" cmpd="sng" algn="ctr">
+          <a:solidFill>
+            <a:schemeClr val="phClr"/>
+          </a:solidFill>
+          <a:prstDash val="solid"/>
+          <a:miter lim="800000"/>
+        </a:ln>
+      </a:lnStyleLst>
+      <a:effectStyleLst>
+        <a:effectStyle>
+          <a:effectLst/>
+        </a:effectStyle>
+        <a:effectStyle>
+          <a:effectLst/>
+        </a:effectStyle>
+        <a:effectStyle>
+          <a:effectLst>
+            <a:outerShdw blurRad="57150" dist="19050" dir="5400000" algn="ctr" rotWithShape="0">
+              <a:srgbClr val="000000">
+                <a:alpha val="63000"/>
+              </a:srgbClr>
+            </a:outerShdw>
+          </a:effectLst>
+        </a:effectStyle>
+      </a:effectStyleLst>
+      <a:bgFillStyleLst>
+        <a:solidFill>
+          <a:schemeClr val="phClr"/>
+        </a:solidFill>
+        <a:solidFill>
+          <a:schemeClr val="phClr">
+            <a:tint val="95000"/>
+            <a:satMod val="170000"/>
+          </a:schemeClr>
+        </a:solidFill>
+        <a:gradFill rotWithShape="1">
+          <a:gsLst>
+            <a:gs pos="0">
+              <a:schemeClr val="phClr">
+                <a:tint val="93000"/>
+                <a:satMod val="150000"/>
+                <a:shade val="98000"/>
+                <a:lumMod val="102000"/>
+              </a:schemeClr>
+            </a:gs>
+            <a:gs pos="50000">
+              <a:schemeClr val="phClr">
+                <a:tint val="98000"/>
+                <a:satMod val="130000"/>
+                <a:shade val="90000"/>
+                <a:lumMod val="103000"/>
+              </a:schemeClr>
+            </a:gs>
+            <a:gs pos="100000">
+              <a:schemeClr val="phClr">
+                <a:shade val="63000"/>
+                <a:satMod val="120000"/>
+              </a:schemeClr>
+            </a:gs>
+          </a:gsLst>
+          <a:lin ang="5400000" scaled="0"/>
+        </a:gradFill>
+      </a:bgFillStyleLst>
+    </a:fmtScheme>
+  </a:themeElements>
+  <a:objectDefaults>
+    <a:lnDef>
+      <a:spPr/>
+      <a:bodyPr/>
+      <a:lstStyle/>
+      <a:style>
+        <a:lnRef idx="2">
+          <a:schemeClr val="accent1"/>
+        </a:lnRef>
+        <a:fillRef idx="0">
+          <a:schemeClr val="accent1"/>
+        </a:fillRef>
+        <a:effectRef idx="1">
+          <a:schemeClr val="accent1"/>
+        </a:effectRef>
+        <a:fontRef idx="minor">
+          <a:schemeClr val="tx1"/>
+        </a:fontRef>
+      </a:style>
+    </a:lnDef>
+  </a:objectDefaults>
+  <a:extraClrSchemeLst/>
+  <a:extLst>
+    <a:ext uri="{05A4C25C-085E-4340-85A3-A5531E510DB2}">
+      <thm15:themeFamily xmlns:thm15="http://schemas.microsoft.com/office/thememl/2012/main" name="Office Theme" id="{2E142A2C-CD16-42D6-873A-C26D2A0506FA}" vid="{1BDDFF52-6CD6-40A5-AB3C-68EB2F1E4D0A}"/>
+    </a:ext>
+  </a:extLst>
+</a:theme>
 </file>
</xml_diff>

<commit_message>
writing out conclusions a bit more
</commit_message>
<xml_diff>
--- a/upgrade figures.pptx
+++ b/upgrade figures.pptx
@@ -5,13 +5,15 @@
     <p:sldMasterId id="2147483648" r:id="rId1"/>
   </p:sldMasterIdLst>
   <p:notesMasterIdLst>
-    <p:notesMasterId r:id="rId6"/>
+    <p:notesMasterId r:id="rId8"/>
   </p:notesMasterIdLst>
   <p:sldIdLst>
     <p:sldId id="257" r:id="rId2"/>
     <p:sldId id="256" r:id="rId3"/>
     <p:sldId id="258" r:id="rId4"/>
     <p:sldId id="259" r:id="rId5"/>
+    <p:sldId id="260" r:id="rId6"/>
+    <p:sldId id="261" r:id="rId7"/>
   </p:sldIdLst>
   <p:sldSz cx="12192000" cy="6858000"/>
   <p:notesSz cx="6858000" cy="9144000"/>
@@ -200,7 +202,7 @@
           <a:p>
             <a:fld id="{CECEA2D8-CBAA-1E4A-AA09-141BFA2CD374}" type="datetimeFigureOut">
               <a:rPr lang="en-GB" smtClean="0"/>
-              <a:t>19/03/2024</a:t>
+              <a:t>22/03/2024</a:t>
             </a:fld>
             <a:endParaRPr lang="en-GB"/>
           </a:p>
@@ -551,6 +553,90 @@
 </p:notes>
 </file>
 
+<file path=ppt/notesSlides/notesSlide2.xml><?xml version="1.0" encoding="utf-8"?>
+<p:notes xmlns:a="http://schemas.openxmlformats.org/drawingml/2006/main" xmlns:r="http://schemas.openxmlformats.org/officeDocument/2006/relationships" xmlns:p="http://schemas.openxmlformats.org/presentationml/2006/main">
+  <p:cSld>
+    <p:spTree>
+      <p:nvGrpSpPr>
+        <p:cNvPr id="1" name=""/>
+        <p:cNvGrpSpPr/>
+        <p:nvPr/>
+      </p:nvGrpSpPr>
+      <p:grpSpPr>
+        <a:xfrm>
+          <a:off x="0" y="0"/>
+          <a:ext cx="0" cy="0"/>
+          <a:chOff x="0" y="0"/>
+          <a:chExt cx="0" cy="0"/>
+        </a:xfrm>
+      </p:grpSpPr>
+      <p:sp>
+        <p:nvSpPr>
+          <p:cNvPr id="2" name="Slide Image Placeholder 1"/>
+          <p:cNvSpPr>
+            <a:spLocks noGrp="1" noRot="1" noChangeAspect="1"/>
+          </p:cNvSpPr>
+          <p:nvPr>
+            <p:ph type="sldImg"/>
+          </p:nvPr>
+        </p:nvSpPr>
+        <p:spPr/>
+      </p:sp>
+      <p:sp>
+        <p:nvSpPr>
+          <p:cNvPr id="3" name="Notes Placeholder 2"/>
+          <p:cNvSpPr>
+            <a:spLocks noGrp="1"/>
+          </p:cNvSpPr>
+          <p:nvPr>
+            <p:ph type="body" idx="1"/>
+          </p:nvPr>
+        </p:nvSpPr>
+        <p:spPr/>
+        <p:txBody>
+          <a:bodyPr/>
+          <a:lstStyle/>
+          <a:p>
+            <a:endParaRPr lang="en-GB" dirty="0"/>
+          </a:p>
+        </p:txBody>
+      </p:sp>
+      <p:sp>
+        <p:nvSpPr>
+          <p:cNvPr id="4" name="Slide Number Placeholder 3"/>
+          <p:cNvSpPr>
+            <a:spLocks noGrp="1"/>
+          </p:cNvSpPr>
+          <p:nvPr>
+            <p:ph type="sldNum" sz="quarter" idx="5"/>
+          </p:nvPr>
+        </p:nvSpPr>
+        <p:spPr/>
+        <p:txBody>
+          <a:bodyPr/>
+          <a:lstStyle/>
+          <a:p>
+            <a:fld id="{466AC267-C18B-E84D-9604-8DC72C069D4E}" type="slidenum">
+              <a:rPr lang="en-GB" smtClean="0"/>
+              <a:t>5</a:t>
+            </a:fld>
+            <a:endParaRPr lang="en-GB"/>
+          </a:p>
+        </p:txBody>
+      </p:sp>
+    </p:spTree>
+    <p:extLst>
+      <p:ext uri="{BB962C8B-B14F-4D97-AF65-F5344CB8AC3E}">
+        <p14:creationId xmlns:p14="http://schemas.microsoft.com/office/powerpoint/2010/main" val="3397250007"/>
+      </p:ext>
+    </p:extLst>
+  </p:cSld>
+  <p:clrMapOvr>
+    <a:masterClrMapping/>
+  </p:clrMapOvr>
+</p:notes>
+</file>
+
 <file path=ppt/slideLayouts/slideLayout1.xml><?xml version="1.0" encoding="utf-8"?>
 <p:sldLayout xmlns:a="http://schemas.openxmlformats.org/drawingml/2006/main" xmlns:r="http://schemas.openxmlformats.org/officeDocument/2006/relationships" xmlns:p="http://schemas.openxmlformats.org/presentationml/2006/main" type="title" preserve="1">
   <p:cSld name="Title Slide">
@@ -698,7 +784,7 @@
           <a:p>
             <a:fld id="{E4D19850-80EB-C04C-A1A6-3B2217F8D0AE}" type="datetimeFigureOut">
               <a:rPr lang="en-GB" smtClean="0"/>
-              <a:t>19/03/2024</a:t>
+              <a:t>22/03/2024</a:t>
             </a:fld>
             <a:endParaRPr lang="en-GB"/>
           </a:p>
@@ -896,7 +982,7 @@
           <a:p>
             <a:fld id="{E4D19850-80EB-C04C-A1A6-3B2217F8D0AE}" type="datetimeFigureOut">
               <a:rPr lang="en-GB" smtClean="0"/>
-              <a:t>19/03/2024</a:t>
+              <a:t>22/03/2024</a:t>
             </a:fld>
             <a:endParaRPr lang="en-GB"/>
           </a:p>
@@ -1104,7 +1190,7 @@
           <a:p>
             <a:fld id="{E4D19850-80EB-C04C-A1A6-3B2217F8D0AE}" type="datetimeFigureOut">
               <a:rPr lang="en-GB" smtClean="0"/>
-              <a:t>19/03/2024</a:t>
+              <a:t>22/03/2024</a:t>
             </a:fld>
             <a:endParaRPr lang="en-GB"/>
           </a:p>
@@ -1302,7 +1388,7 @@
           <a:p>
             <a:fld id="{E4D19850-80EB-C04C-A1A6-3B2217F8D0AE}" type="datetimeFigureOut">
               <a:rPr lang="en-GB" smtClean="0"/>
-              <a:t>19/03/2024</a:t>
+              <a:t>22/03/2024</a:t>
             </a:fld>
             <a:endParaRPr lang="en-GB"/>
           </a:p>
@@ -1577,7 +1663,7 @@
           <a:p>
             <a:fld id="{E4D19850-80EB-C04C-A1A6-3B2217F8D0AE}" type="datetimeFigureOut">
               <a:rPr lang="en-GB" smtClean="0"/>
-              <a:t>19/03/2024</a:t>
+              <a:t>22/03/2024</a:t>
             </a:fld>
             <a:endParaRPr lang="en-GB"/>
           </a:p>
@@ -1842,7 +1928,7 @@
           <a:p>
             <a:fld id="{E4D19850-80EB-C04C-A1A6-3B2217F8D0AE}" type="datetimeFigureOut">
               <a:rPr lang="en-GB" smtClean="0"/>
-              <a:t>19/03/2024</a:t>
+              <a:t>22/03/2024</a:t>
             </a:fld>
             <a:endParaRPr lang="en-GB"/>
           </a:p>
@@ -2254,7 +2340,7 @@
           <a:p>
             <a:fld id="{E4D19850-80EB-C04C-A1A6-3B2217F8D0AE}" type="datetimeFigureOut">
               <a:rPr lang="en-GB" smtClean="0"/>
-              <a:t>19/03/2024</a:t>
+              <a:t>22/03/2024</a:t>
             </a:fld>
             <a:endParaRPr lang="en-GB"/>
           </a:p>
@@ -2395,7 +2481,7 @@
           <a:p>
             <a:fld id="{E4D19850-80EB-C04C-A1A6-3B2217F8D0AE}" type="datetimeFigureOut">
               <a:rPr lang="en-GB" smtClean="0"/>
-              <a:t>19/03/2024</a:t>
+              <a:t>22/03/2024</a:t>
             </a:fld>
             <a:endParaRPr lang="en-GB"/>
           </a:p>
@@ -2508,7 +2594,7 @@
           <a:p>
             <a:fld id="{E4D19850-80EB-C04C-A1A6-3B2217F8D0AE}" type="datetimeFigureOut">
               <a:rPr lang="en-GB" smtClean="0"/>
-              <a:t>19/03/2024</a:t>
+              <a:t>22/03/2024</a:t>
             </a:fld>
             <a:endParaRPr lang="en-GB"/>
           </a:p>
@@ -2819,7 +2905,7 @@
           <a:p>
             <a:fld id="{E4D19850-80EB-C04C-A1A6-3B2217F8D0AE}" type="datetimeFigureOut">
               <a:rPr lang="en-GB" smtClean="0"/>
-              <a:t>19/03/2024</a:t>
+              <a:t>22/03/2024</a:t>
             </a:fld>
             <a:endParaRPr lang="en-GB"/>
           </a:p>
@@ -3107,7 +3193,7 @@
           <a:p>
             <a:fld id="{E4D19850-80EB-C04C-A1A6-3B2217F8D0AE}" type="datetimeFigureOut">
               <a:rPr lang="en-GB" smtClean="0"/>
-              <a:t>19/03/2024</a:t>
+              <a:t>22/03/2024</a:t>
             </a:fld>
             <a:endParaRPr lang="en-GB"/>
           </a:p>
@@ -3348,7 +3434,7 @@
           <a:p>
             <a:fld id="{E4D19850-80EB-C04C-A1A6-3B2217F8D0AE}" type="datetimeFigureOut">
               <a:rPr lang="en-GB" smtClean="0"/>
-              <a:t>19/03/2024</a:t>
+              <a:t>22/03/2024</a:t>
             </a:fld>
             <a:endParaRPr lang="en-GB"/>
           </a:p>
@@ -5098,6 +5184,158 @@
     <p:extLst>
       <p:ext uri="{BB962C8B-B14F-4D97-AF65-F5344CB8AC3E}">
         <p14:creationId xmlns:p14="http://schemas.microsoft.com/office/powerpoint/2010/main" val="3640822484"/>
+      </p:ext>
+    </p:extLst>
+  </p:cSld>
+  <p:clrMapOvr>
+    <a:masterClrMapping/>
+  </p:clrMapOvr>
+</p:sld>
+</file>
+
+<file path=ppt/slides/slide5.xml><?xml version="1.0" encoding="utf-8"?>
+<p:sld xmlns:a="http://schemas.openxmlformats.org/drawingml/2006/main" xmlns:r="http://schemas.openxmlformats.org/officeDocument/2006/relationships" xmlns:p="http://schemas.openxmlformats.org/presentationml/2006/main">
+  <p:cSld>
+    <p:spTree>
+      <p:nvGrpSpPr>
+        <p:cNvPr id="1" name=""/>
+        <p:cNvGrpSpPr/>
+        <p:nvPr/>
+      </p:nvGrpSpPr>
+      <p:grpSpPr>
+        <a:xfrm>
+          <a:off x="0" y="0"/>
+          <a:ext cx="0" cy="0"/>
+          <a:chOff x="0" y="0"/>
+          <a:chExt cx="0" cy="0"/>
+        </a:xfrm>
+      </p:grpSpPr>
+      <p:sp>
+        <p:nvSpPr>
+          <p:cNvPr id="2" name="Title 1">
+            <a:extLst>
+              <a:ext uri="{FF2B5EF4-FFF2-40B4-BE49-F238E27FC236}">
+                <a16:creationId xmlns:a16="http://schemas.microsoft.com/office/drawing/2014/main" id="{3EC77A79-B090-1F09-90AD-4208C17843C2}"/>
+              </a:ext>
+            </a:extLst>
+          </p:cNvPr>
+          <p:cNvSpPr>
+            <a:spLocks noGrp="1"/>
+          </p:cNvSpPr>
+          <p:nvPr>
+            <p:ph type="ctrTitle"/>
+          </p:nvPr>
+        </p:nvSpPr>
+        <p:spPr/>
+        <p:txBody>
+          <a:bodyPr/>
+          <a:lstStyle/>
+          <a:p>
+            <a:r>
+              <a:rPr lang="en-GB" dirty="0"/>
+              <a:t>Fusilli MND</a:t>
+            </a:r>
+          </a:p>
+        </p:txBody>
+      </p:sp>
+      <p:sp>
+        <p:nvSpPr>
+          <p:cNvPr id="3" name="Subtitle 2">
+            <a:extLst>
+              <a:ext uri="{FF2B5EF4-FFF2-40B4-BE49-F238E27FC236}">
+                <a16:creationId xmlns:a16="http://schemas.microsoft.com/office/drawing/2014/main" id="{05BDB5C5-B277-C683-4083-0EA32FA05947}"/>
+              </a:ext>
+            </a:extLst>
+          </p:cNvPr>
+          <p:cNvSpPr>
+            <a:spLocks noGrp="1"/>
+          </p:cNvSpPr>
+          <p:nvPr>
+            <p:ph type="subTitle" idx="1"/>
+          </p:nvPr>
+        </p:nvSpPr>
+        <p:spPr/>
+        <p:txBody>
+          <a:bodyPr>
+            <a:normAutofit/>
+          </a:bodyPr>
+          <a:lstStyle/>
+          <a:p>
+            <a:pPr marL="457200" indent="-457200" algn="l">
+              <a:buFont typeface="+mj-lt"/>
+              <a:buAutoNum type="arabicPeriod"/>
+            </a:pPr>
+            <a:r>
+              <a:rPr lang="en-GB" dirty="0"/>
+              <a:t>Model architectures</a:t>
+            </a:r>
+          </a:p>
+        </p:txBody>
+      </p:sp>
+    </p:spTree>
+    <p:extLst>
+      <p:ext uri="{BB962C8B-B14F-4D97-AF65-F5344CB8AC3E}">
+        <p14:creationId xmlns:p14="http://schemas.microsoft.com/office/powerpoint/2010/main" val="1540334248"/>
+      </p:ext>
+    </p:extLst>
+  </p:cSld>
+  <p:clrMapOvr>
+    <a:masterClrMapping/>
+  </p:clrMapOvr>
+</p:sld>
+</file>
+
+<file path=ppt/slides/slide6.xml><?xml version="1.0" encoding="utf-8"?>
+<p:sld xmlns:a="http://schemas.openxmlformats.org/drawingml/2006/main" xmlns:r="http://schemas.openxmlformats.org/officeDocument/2006/relationships" xmlns:p="http://schemas.openxmlformats.org/presentationml/2006/main">
+  <p:cSld>
+    <p:spTree>
+      <p:nvGrpSpPr>
+        <p:cNvPr id="1" name=""/>
+        <p:cNvGrpSpPr/>
+        <p:nvPr/>
+      </p:nvGrpSpPr>
+      <p:grpSpPr>
+        <a:xfrm>
+          <a:off x="0" y="0"/>
+          <a:ext cx="0" cy="0"/>
+          <a:chOff x="0" y="0"/>
+          <a:chExt cx="0" cy="0"/>
+        </a:xfrm>
+      </p:grpSpPr>
+      <p:pic>
+        <p:nvPicPr>
+          <p:cNvPr id="5" name="Picture 4" descr="A diagram of a multiplying process&#10;&#10;Description automatically generated">
+            <a:extLst>
+              <a:ext uri="{FF2B5EF4-FFF2-40B4-BE49-F238E27FC236}">
+                <a16:creationId xmlns:a16="http://schemas.microsoft.com/office/drawing/2014/main" id="{43ED3E69-6D45-2B9C-EE0E-4445B517D82E}"/>
+              </a:ext>
+            </a:extLst>
+          </p:cNvPr>
+          <p:cNvPicPr>
+            <a:picLocks noChangeAspect="1"/>
+          </p:cNvPicPr>
+          <p:nvPr/>
+        </p:nvPicPr>
+        <p:blipFill>
+          <a:blip r:embed="rId2"/>
+          <a:stretch>
+            <a:fillRect/>
+          </a:stretch>
+        </p:blipFill>
+        <p:spPr>
+          <a:xfrm>
+            <a:off x="961901" y="1646920"/>
+            <a:ext cx="7160821" cy="1782079"/>
+          </a:xfrm>
+          <a:prstGeom prst="rect">
+            <a:avLst/>
+          </a:prstGeom>
+        </p:spPr>
+      </p:pic>
+    </p:spTree>
+    <p:extLst>
+      <p:ext uri="{BB962C8B-B14F-4D97-AF65-F5344CB8AC3E}">
+        <p14:creationId xmlns:p14="http://schemas.microsoft.com/office/powerpoint/2010/main" val="489298538"/>
       </p:ext>
     </p:extLst>
   </p:cSld>

</xml_diff>